<commit_message>
update presentation for upol
</commit_message>
<xml_diff>
--- a/ai-intro/ai_introduction.pptx
+++ b/ai-intro/ai_introduction.pptx
@@ -5,29 +5,31 @@
     <p:sldMasterId id="2147483732" r:id="rId4"/>
   </p:sldMasterIdLst>
   <p:notesMasterIdLst>
-    <p:notesMasterId r:id="rId22"/>
+    <p:notesMasterId r:id="rId24"/>
   </p:notesMasterIdLst>
   <p:handoutMasterIdLst>
-    <p:handoutMasterId r:id="rId23"/>
+    <p:handoutMasterId r:id="rId25"/>
   </p:handoutMasterIdLst>
   <p:sldIdLst>
     <p:sldId id="278" r:id="rId5"/>
-    <p:sldId id="340" r:id="rId6"/>
-    <p:sldId id="341" r:id="rId7"/>
-    <p:sldId id="342" r:id="rId8"/>
-    <p:sldId id="343" r:id="rId9"/>
-    <p:sldId id="344" r:id="rId10"/>
-    <p:sldId id="345" r:id="rId11"/>
-    <p:sldId id="346" r:id="rId12"/>
-    <p:sldId id="354" r:id="rId13"/>
-    <p:sldId id="349" r:id="rId14"/>
-    <p:sldId id="350" r:id="rId15"/>
-    <p:sldId id="348" r:id="rId16"/>
-    <p:sldId id="351" r:id="rId17"/>
-    <p:sldId id="352" r:id="rId18"/>
-    <p:sldId id="353" r:id="rId19"/>
-    <p:sldId id="347" r:id="rId20"/>
-    <p:sldId id="298" r:id="rId21"/>
+    <p:sldId id="355" r:id="rId6"/>
+    <p:sldId id="356" r:id="rId7"/>
+    <p:sldId id="340" r:id="rId8"/>
+    <p:sldId id="341" r:id="rId9"/>
+    <p:sldId id="342" r:id="rId10"/>
+    <p:sldId id="343" r:id="rId11"/>
+    <p:sldId id="344" r:id="rId12"/>
+    <p:sldId id="345" r:id="rId13"/>
+    <p:sldId id="346" r:id="rId14"/>
+    <p:sldId id="354" r:id="rId15"/>
+    <p:sldId id="349" r:id="rId16"/>
+    <p:sldId id="350" r:id="rId17"/>
+    <p:sldId id="348" r:id="rId18"/>
+    <p:sldId id="351" r:id="rId19"/>
+    <p:sldId id="352" r:id="rId20"/>
+    <p:sldId id="353" r:id="rId21"/>
+    <p:sldId id="347" r:id="rId22"/>
+    <p:sldId id="298" r:id="rId23"/>
   </p:sldIdLst>
   <p:sldSz cx="12192000" cy="6858000"/>
   <p:notesSz cx="6797675" cy="9928225"/>
@@ -242,7 +244,7 @@
           <a:p>
             <a:fld id="{B270C287-42ED-47F2-9D65-F52E788F000A}" type="datetimeFigureOut">
               <a:rPr lang="cs-CZ" smtClean="0"/>
-              <a:t>11.04.19</a:t>
+              <a:t>15.04.19</a:t>
             </a:fld>
             <a:endParaRPr lang="cs-CZ"/>
           </a:p>
@@ -419,7 +421,7 @@
           <a:p>
             <a:fld id="{A2E12695-9BD3-418A-9D8A-5431790D681E}" type="datetimeFigureOut">
               <a:rPr lang="cs-CZ" smtClean="0"/>
-              <a:t>11.04.19</a:t>
+              <a:t>15.04.19</a:t>
             </a:fld>
             <a:endParaRPr lang="cs-CZ"/>
           </a:p>
@@ -836,7 +838,7 @@
           <a:p>
             <a:fld id="{D15F3063-993B-4A5F-929B-EE4198374DC6}" type="slidenum">
               <a:rPr lang="cs-CZ" smtClean="0"/>
-              <a:t>4</a:t>
+              <a:t>6</a:t>
             </a:fld>
             <a:endParaRPr lang="cs-CZ"/>
           </a:p>
@@ -1006,7 +1008,7 @@
           <a:p>
             <a:fld id="{9BA716FA-0F84-4607-8044-4F5D8FAD37A9}" type="datetimeFigureOut">
               <a:rPr lang="cs-CZ" smtClean="0"/>
-              <a:t>11.04.19</a:t>
+              <a:t>15.04.19</a:t>
             </a:fld>
             <a:endParaRPr lang="cs-CZ"/>
           </a:p>
@@ -1364,7 +1366,7 @@
           <a:p>
             <a:fld id="{9BA716FA-0F84-4607-8044-4F5D8FAD37A9}" type="datetimeFigureOut">
               <a:rPr lang="cs-CZ" smtClean="0"/>
-              <a:t>11.04.19</a:t>
+              <a:t>15.04.19</a:t>
             </a:fld>
             <a:endParaRPr lang="cs-CZ"/>
           </a:p>
@@ -1732,7 +1734,7 @@
           <a:p>
             <a:fld id="{9BA716FA-0F84-4607-8044-4F5D8FAD37A9}" type="datetimeFigureOut">
               <a:rPr lang="cs-CZ" smtClean="0"/>
-              <a:t>11.04.19</a:t>
+              <a:t>15.04.19</a:t>
             </a:fld>
             <a:endParaRPr lang="cs-CZ"/>
           </a:p>
@@ -2032,7 +2034,7 @@
           <a:p>
             <a:fld id="{21AEA93E-2605-491F-9C89-150AD994DD12}" type="datetimeFigureOut">
               <a:rPr lang="cs-CZ" smtClean="0"/>
-              <a:t>11.04.19</a:t>
+              <a:t>15.04.19</a:t>
             </a:fld>
             <a:endParaRPr lang="cs-CZ"/>
           </a:p>
@@ -2143,7 +2145,7 @@
           <a:p>
             <a:fld id="{21AEA93E-2605-491F-9C89-150AD994DD12}" type="datetimeFigureOut">
               <a:rPr lang="cs-CZ" smtClean="0"/>
-              <a:t>11.04.19</a:t>
+              <a:t>15.04.19</a:t>
             </a:fld>
             <a:endParaRPr lang="cs-CZ"/>
           </a:p>
@@ -2458,7 +2460,7 @@
           <a:p>
             <a:fld id="{9BA716FA-0F84-4607-8044-4F5D8FAD37A9}" type="datetimeFigureOut">
               <a:rPr lang="cs-CZ" smtClean="0"/>
-              <a:t>11.04.19</a:t>
+              <a:t>15.04.19</a:t>
             </a:fld>
             <a:endParaRPr lang="cs-CZ"/>
           </a:p>
@@ -2852,7 +2854,7 @@
           <a:p>
             <a:fld id="{9BA716FA-0F84-4607-8044-4F5D8FAD37A9}" type="datetimeFigureOut">
               <a:rPr lang="cs-CZ" smtClean="0"/>
-              <a:t>11.04.19</a:t>
+              <a:t>15.04.19</a:t>
             </a:fld>
             <a:endParaRPr lang="cs-CZ"/>
           </a:p>
@@ -3325,7 +3327,7 @@
           <a:p>
             <a:fld id="{9BA716FA-0F84-4607-8044-4F5D8FAD37A9}" type="datetimeFigureOut">
               <a:rPr lang="cs-CZ" smtClean="0"/>
-              <a:t>11.04.19</a:t>
+              <a:t>15.04.19</a:t>
             </a:fld>
             <a:endParaRPr lang="cs-CZ"/>
           </a:p>
@@ -3938,7 +3940,7 @@
           <a:p>
             <a:fld id="{9BA716FA-0F84-4607-8044-4F5D8FAD37A9}" type="datetimeFigureOut">
               <a:rPr lang="cs-CZ" smtClean="0"/>
-              <a:t>11.04.19</a:t>
+              <a:t>15.04.19</a:t>
             </a:fld>
             <a:endParaRPr lang="cs-CZ"/>
           </a:p>
@@ -4198,7 +4200,7 @@
           <a:p>
             <a:fld id="{9BA716FA-0F84-4607-8044-4F5D8FAD37A9}" type="datetimeFigureOut">
               <a:rPr lang="cs-CZ" smtClean="0"/>
-              <a:t>11.04.19</a:t>
+              <a:t>15.04.19</a:t>
             </a:fld>
             <a:endParaRPr lang="cs-CZ"/>
           </a:p>
@@ -4431,7 +4433,7 @@
           <a:p>
             <a:fld id="{9BA716FA-0F84-4607-8044-4F5D8FAD37A9}" type="datetimeFigureOut">
               <a:rPr lang="cs-CZ" smtClean="0"/>
-              <a:t>11.04.19</a:t>
+              <a:t>15.04.19</a:t>
             </a:fld>
             <a:endParaRPr lang="cs-CZ"/>
           </a:p>
@@ -4886,7 +4888,7 @@
           <a:p>
             <a:fld id="{9BA716FA-0F84-4607-8044-4F5D8FAD37A9}" type="datetimeFigureOut">
               <a:rPr lang="cs-CZ" smtClean="0"/>
-              <a:t>11.04.19</a:t>
+              <a:t>15.04.19</a:t>
             </a:fld>
             <a:endParaRPr lang="cs-CZ"/>
           </a:p>
@@ -5299,7 +5301,7 @@
           <a:p>
             <a:fld id="{9BA716FA-0F84-4607-8044-4F5D8FAD37A9}" type="datetimeFigureOut">
               <a:rPr lang="cs-CZ" smtClean="0"/>
-              <a:t>11.04.19</a:t>
+              <a:t>15.04.19</a:t>
             </a:fld>
             <a:endParaRPr lang="cs-CZ"/>
           </a:p>
@@ -5660,7 +5662,7 @@
           <a:p>
             <a:fld id="{9BA716FA-0F84-4607-8044-4F5D8FAD37A9}" type="datetimeFigureOut">
               <a:rPr lang="cs-CZ" smtClean="0"/>
-              <a:t>11.04.19</a:t>
+              <a:t>15.04.19</a:t>
             </a:fld>
             <a:endParaRPr lang="cs-CZ"/>
           </a:p>
@@ -6489,7 +6491,7 @@
                 <a:ea typeface="Open Sans Light" panose="020B0306030504020204" pitchFamily="34" charset="0"/>
                 <a:cs typeface="Open Sans Light" panose="020B0306030504020204" pitchFamily="34" charset="0"/>
               </a:rPr>
-              <a:t>11th </a:t>
+              <a:t>16th </a:t>
             </a:r>
             <a:r>
               <a:rPr lang="cs-CZ" sz="1400" dirty="0" err="1">
@@ -6646,7 +6648,7 @@
           <p:cNvPr id="2" name="Title 1">
             <a:extLst>
               <a:ext uri="{FF2B5EF4-FFF2-40B4-BE49-F238E27FC236}">
-                <a16:creationId xmlns:a16="http://schemas.microsoft.com/office/drawing/2014/main" id="{D9EC648D-1595-7748-95BC-8F62875BA7C2}"/>
+                <a16:creationId xmlns:a16="http://schemas.microsoft.com/office/drawing/2014/main" id="{8AD56874-F4D3-664F-9C2F-C2BCABC7D8F8}"/>
               </a:ext>
             </a:extLst>
           </p:cNvPr>
@@ -6663,22 +6665,13 @@
           <a:lstStyle/>
           <a:p>
             <a:r>
+              <a:rPr lang="cs-CZ" dirty="0" err="1"/>
+              <a:t>Neural</a:t>
+            </a:r>
+            <a:r>
               <a:rPr lang="cs-CZ" dirty="0"/>
-              <a:t>DL </a:t>
-            </a:r>
-            <a:r>
-              <a:rPr lang="cs-CZ" dirty="0" err="1"/>
-              <a:t>usual</a:t>
-            </a:r>
-            <a:r>
-              <a:rPr lang="cs-CZ" dirty="0"/>
-              <a:t> </a:t>
-            </a:r>
-            <a:r>
-              <a:rPr lang="cs-CZ" dirty="0" err="1"/>
-              <a:t>tasks</a:t>
-            </a:r>
-            <a:endParaRPr lang="cs-CZ" dirty="0"/>
+              <a:t> Network</a:t>
+            </a:r>
           </a:p>
         </p:txBody>
       </p:sp>
@@ -6687,7 +6680,7 @@
           <p:cNvPr id="3" name="Content Placeholder 2">
             <a:extLst>
               <a:ext uri="{FF2B5EF4-FFF2-40B4-BE49-F238E27FC236}">
-                <a16:creationId xmlns:a16="http://schemas.microsoft.com/office/drawing/2014/main" id="{92C27B3F-14D8-6449-9365-8DEA34CE97E4}"/>
+                <a16:creationId xmlns:a16="http://schemas.microsoft.com/office/drawing/2014/main" id="{9C480C33-FD15-0146-AF0D-41C64A5624CD}"/>
               </a:ext>
             </a:extLst>
           </p:cNvPr>
@@ -6700,7 +6693,9 @@
         </p:nvSpPr>
         <p:spPr/>
         <p:txBody>
-          <a:bodyPr/>
+          <a:bodyPr>
+            <a:normAutofit lnSpcReduction="10000"/>
+          </a:bodyPr>
           <a:lstStyle/>
           <a:p>
             <a:pPr>
@@ -6710,16 +6705,37 @@
             </a:pPr>
             <a:r>
               <a:rPr lang="cs-CZ" dirty="0"/>
-              <a:t>spam </a:t>
-            </a:r>
-            <a:r>
-              <a:rPr lang="cs-CZ" dirty="0" err="1"/>
-              <a:t>filter</a:t>
+              <a:t>Set </a:t>
+            </a:r>
+            <a:r>
+              <a:rPr lang="cs-CZ" dirty="0" err="1"/>
+              <a:t>of</a:t>
             </a:r>
             <a:r>
               <a:rPr lang="cs-CZ" dirty="0"/>
-              <a:t> – spam / not spam</a:t>
-            </a:r>
+              <a:t> </a:t>
+            </a:r>
+            <a:r>
+              <a:rPr lang="cs-CZ" dirty="0" err="1"/>
+              <a:t>algorithms</a:t>
+            </a:r>
+            <a:r>
+              <a:rPr lang="cs-CZ" dirty="0"/>
+              <a:t> - </a:t>
+            </a:r>
+            <a:r>
+              <a:rPr lang="cs-CZ" dirty="0" err="1"/>
+              <a:t>Human</a:t>
+            </a:r>
+            <a:r>
+              <a:rPr lang="cs-CZ" dirty="0"/>
+              <a:t> brain </a:t>
+            </a:r>
+            <a:r>
+              <a:rPr lang="cs-CZ" dirty="0" err="1"/>
+              <a:t>like</a:t>
+            </a:r>
+            <a:endParaRPr lang="cs-CZ" dirty="0"/>
           </a:p>
           <a:p>
             <a:pPr>
@@ -6729,7 +6745,7 @@
             </a:pPr>
             <a:r>
               <a:rPr lang="cs-CZ" dirty="0" err="1"/>
-              <a:t>recognize</a:t>
+              <a:t>Recognize</a:t>
             </a:r>
             <a:r>
               <a:rPr lang="cs-CZ" dirty="0"/>
@@ -6737,31 +6753,7 @@
             </a:r>
             <a:r>
               <a:rPr lang="cs-CZ" dirty="0" err="1"/>
-              <a:t>facial</a:t>
-            </a:r>
-            <a:r>
-              <a:rPr lang="cs-CZ" dirty="0"/>
-              <a:t> </a:t>
-            </a:r>
-            <a:r>
-              <a:rPr lang="cs-CZ" dirty="0" err="1"/>
-              <a:t>expressions</a:t>
-            </a:r>
-            <a:r>
-              <a:rPr lang="cs-CZ" dirty="0"/>
-              <a:t> – </a:t>
-            </a:r>
-            <a:r>
-              <a:rPr lang="cs-CZ" dirty="0" err="1"/>
-              <a:t>angry</a:t>
-            </a:r>
-            <a:r>
-              <a:rPr lang="cs-CZ" dirty="0"/>
-              <a:t> / </a:t>
-            </a:r>
-            <a:r>
-              <a:rPr lang="cs-CZ" dirty="0" err="1"/>
-              <a:t>joyful</a:t>
+              <a:t>pattern</a:t>
             </a:r>
             <a:endParaRPr lang="cs-CZ" dirty="0"/>
           </a:p>
@@ -6773,7 +6765,7 @@
             </a:pPr>
             <a:r>
               <a:rPr lang="cs-CZ" dirty="0" err="1"/>
-              <a:t>recognize</a:t>
+              <a:t>Finding</a:t>
             </a:r>
             <a:r>
               <a:rPr lang="cs-CZ" dirty="0"/>
@@ -6781,12 +6773,9 @@
             </a:r>
             <a:r>
               <a:rPr lang="cs-CZ" dirty="0" err="1"/>
-              <a:t>gesture</a:t>
-            </a:r>
-            <a:r>
-              <a:rPr lang="cs-CZ" dirty="0"/>
-              <a:t> in video</a:t>
-            </a:r>
+              <a:t>similarities</a:t>
+            </a:r>
+            <a:endParaRPr lang="cs-CZ" dirty="0"/>
           </a:p>
           <a:p>
             <a:pPr>
@@ -6795,8 +6784,20 @@
               </a:lnSpc>
             </a:pPr>
             <a:r>
-              <a:rPr lang="cs-CZ" dirty="0" err="1"/>
-              <a:t>identify</a:t>
+              <a:rPr lang="cs-CZ" dirty="0"/>
+              <a:t>Real data (image, </a:t>
+            </a:r>
+            <a:r>
+              <a:rPr lang="cs-CZ" dirty="0" err="1"/>
+              <a:t>sound</a:t>
+            </a:r>
+            <a:r>
+              <a:rPr lang="cs-CZ" dirty="0"/>
+              <a:t>, text …) =&gt; </a:t>
+            </a:r>
+            <a:r>
+              <a:rPr lang="cs-CZ" dirty="0" err="1"/>
+              <a:t>numerical</a:t>
             </a:r>
             <a:r>
               <a:rPr lang="cs-CZ" dirty="0"/>
@@ -6804,20 +6805,9 @@
             </a:r>
             <a:r>
               <a:rPr lang="cs-CZ" dirty="0" err="1"/>
-              <a:t>objects</a:t>
-            </a:r>
-            <a:r>
-              <a:rPr lang="cs-CZ" dirty="0"/>
-              <a:t> in </a:t>
-            </a:r>
-            <a:r>
-              <a:rPr lang="cs-CZ" dirty="0" err="1"/>
-              <a:t>images</a:t>
-            </a:r>
-            <a:r>
-              <a:rPr lang="cs-CZ" dirty="0"/>
-              <a:t> – stop sign, car, …</a:t>
-            </a:r>
+              <a:t>representation</a:t>
+            </a:r>
+            <a:endParaRPr lang="cs-CZ" dirty="0"/>
           </a:p>
           <a:p>
             <a:pPr>
@@ -6826,60 +6816,61 @@
               </a:lnSpc>
             </a:pPr>
             <a:r>
-              <a:rPr lang="cs-CZ" dirty="0" err="1"/>
-              <a:t>detect</a:t>
-            </a:r>
-            <a:r>
               <a:rPr lang="cs-CZ" dirty="0"/>
-              <a:t> </a:t>
-            </a:r>
-            <a:r>
-              <a:rPr lang="cs-CZ" dirty="0" err="1"/>
-              <a:t>voices</a:t>
+              <a:t>Universal </a:t>
+            </a:r>
+            <a:r>
+              <a:rPr lang="cs-CZ" dirty="0" err="1"/>
+              <a:t>Approximator</a:t>
             </a:r>
             <a:r>
               <a:rPr lang="cs-CZ" dirty="0"/>
-              <a:t> – </a:t>
-            </a:r>
-            <a:r>
-              <a:rPr lang="cs-CZ" dirty="0" err="1"/>
-              <a:t>identify</a:t>
+              <a:t> – f(</a:t>
+            </a:r>
+            <a:r>
+              <a:rPr lang="cs-CZ" dirty="0" err="1"/>
+              <a:t>x</a:t>
             </a:r>
             <a:r>
               <a:rPr lang="cs-CZ" dirty="0"/>
-              <a:t> </a:t>
-            </a:r>
-            <a:r>
-              <a:rPr lang="cs-CZ" dirty="0" err="1"/>
-              <a:t>speaker</a:t>
-            </a:r>
-            <a:r>
-              <a:rPr lang="cs-CZ" dirty="0"/>
-              <a:t>, </a:t>
-            </a:r>
-            <a:r>
-              <a:rPr lang="cs-CZ" dirty="0" err="1"/>
-              <a:t>transcribe</a:t>
-            </a:r>
-            <a:r>
-              <a:rPr lang="cs-CZ" dirty="0"/>
-              <a:t> </a:t>
-            </a:r>
-            <a:r>
-              <a:rPr lang="cs-CZ" dirty="0" err="1"/>
-              <a:t>voice</a:t>
-            </a:r>
-            <a:r>
-              <a:rPr lang="cs-CZ" dirty="0"/>
-              <a:t> to text</a:t>
-            </a:r>
+              <a:t>) = </a:t>
+            </a:r>
+            <a:r>
+              <a:rPr lang="cs-CZ" dirty="0" err="1"/>
+              <a:t>y</a:t>
+            </a:r>
+            <a:endParaRPr lang="cs-CZ" dirty="0"/>
+          </a:p>
+          <a:p>
+            <a:pPr>
+              <a:lnSpc>
+                <a:spcPct val="150000"/>
+              </a:lnSpc>
+            </a:pPr>
+            <a:r>
+              <a:rPr lang="en" dirty="0"/>
+              <a:t>f(x) = 3x + 12 or f(x) = 9x - 0.1</a:t>
+            </a:r>
+            <a:endParaRPr lang="cs-CZ" dirty="0"/>
+          </a:p>
+          <a:p>
+            <a:endParaRPr lang="cs-CZ" dirty="0"/>
+          </a:p>
+          <a:p>
+            <a:endParaRPr lang="cs-CZ" dirty="0"/>
+          </a:p>
+          <a:p>
+            <a:pPr marL="0" indent="0">
+              <a:buNone/>
+            </a:pPr>
+            <a:endParaRPr lang="cs-CZ" dirty="0"/>
           </a:p>
         </p:txBody>
       </p:sp>
     </p:spTree>
     <p:extLst>
       <p:ext uri="{BB962C8B-B14F-4D97-AF65-F5344CB8AC3E}">
-        <p14:creationId xmlns:p14="http://schemas.microsoft.com/office/powerpoint/2010/main" val="3756645248"/>
+        <p14:creationId xmlns:p14="http://schemas.microsoft.com/office/powerpoint/2010/main" val="1645345857"/>
       </p:ext>
     </p:extLst>
   </p:cSld>
@@ -6911,7 +6902,7 @@
           <p:cNvPr id="2" name="Title 1">
             <a:extLst>
               <a:ext uri="{FF2B5EF4-FFF2-40B4-BE49-F238E27FC236}">
-                <a16:creationId xmlns:a16="http://schemas.microsoft.com/office/drawing/2014/main" id="{F95FF109-2ED4-E342-9B38-849CE97CD066}"/>
+                <a16:creationId xmlns:a16="http://schemas.microsoft.com/office/drawing/2014/main" id="{D78F981D-8C26-A64F-A9F4-0FFCAE6AA535}"/>
               </a:ext>
             </a:extLst>
           </p:cNvPr>
@@ -6929,9 +6920,12 @@
           <a:p>
             <a:r>
               <a:rPr lang="cs-CZ" dirty="0" err="1"/>
-              <a:t>Clustering</a:t>
-            </a:r>
-            <a:endParaRPr lang="cs-CZ" dirty="0"/>
+              <a:t>Neural</a:t>
+            </a:r>
+            <a:r>
+              <a:rPr lang="cs-CZ" dirty="0"/>
+              <a:t> Network</a:t>
+            </a:r>
           </a:p>
         </p:txBody>
       </p:sp>
@@ -6940,7 +6934,7 @@
           <p:cNvPr id="3" name="Content Placeholder 2">
             <a:extLst>
               <a:ext uri="{FF2B5EF4-FFF2-40B4-BE49-F238E27FC236}">
-                <a16:creationId xmlns:a16="http://schemas.microsoft.com/office/drawing/2014/main" id="{11D1657F-54AD-F445-AB3D-C788DAE2CC0F}"/>
+                <a16:creationId xmlns:a16="http://schemas.microsoft.com/office/drawing/2014/main" id="{EF2EB21E-4E41-1549-8DFE-8FD2B45C1CD1}"/>
               </a:ext>
             </a:extLst>
           </p:cNvPr>
@@ -6956,60 +6950,61 @@
           <a:bodyPr/>
           <a:lstStyle/>
           <a:p>
-            <a:r>
-              <a:rPr lang="en-US" dirty="0"/>
-              <a:t>Unsupervised learning</a:t>
-            </a:r>
-          </a:p>
-          <a:p>
-            <a:r>
-              <a:rPr lang="en-US" dirty="0"/>
-              <a:t>Learning without labels</a:t>
-            </a:r>
-          </a:p>
-          <a:p>
-            <a:r>
-              <a:rPr lang="en-US" dirty="0"/>
-              <a:t>Tasks:</a:t>
-            </a:r>
-          </a:p>
-          <a:p>
-            <a:pPr lvl="1"/>
-            <a:r>
-              <a:rPr lang="en-US" dirty="0"/>
-              <a:t>comparing documents</a:t>
-            </a:r>
-          </a:p>
-          <a:p>
-            <a:pPr lvl="1"/>
-            <a:r>
-              <a:rPr lang="en-US" dirty="0"/>
-              <a:t>finding similar items</a:t>
-            </a:r>
-          </a:p>
-          <a:p>
-            <a:pPr lvl="1"/>
-            <a:r>
-              <a:rPr lang="en-US" dirty="0"/>
-              <a:t>anomalies detection</a:t>
-            </a:r>
-          </a:p>
-          <a:p>
-            <a:pPr lvl="1"/>
-            <a:r>
-              <a:rPr lang="en-US" dirty="0"/>
-              <a:t>unusual behavior – fraud detection</a:t>
-            </a:r>
-          </a:p>
-          <a:p>
-            <a:endParaRPr lang="en-US" dirty="0"/>
-          </a:p>
-        </p:txBody>
-      </p:sp>
+            <a:endParaRPr lang="cs-CZ"/>
+          </a:p>
+        </p:txBody>
+      </p:sp>
+      <p:pic>
+        <p:nvPicPr>
+          <p:cNvPr id="1026" name="Picture 2" descr="Výsledek obrázku pro neural network">
+            <a:extLst>
+              <a:ext uri="{FF2B5EF4-FFF2-40B4-BE49-F238E27FC236}">
+                <a16:creationId xmlns:a16="http://schemas.microsoft.com/office/drawing/2014/main" id="{D8FCB1BC-4935-B94D-AE0A-A921BBF210BD}"/>
+              </a:ext>
+            </a:extLst>
+          </p:cNvPr>
+          <p:cNvPicPr>
+            <a:picLocks noChangeAspect="1" noChangeArrowheads="1"/>
+          </p:cNvPicPr>
+          <p:nvPr/>
+        </p:nvPicPr>
+        <p:blipFill>
+          <a:blip r:embed="rId2">
+            <a:extLst>
+              <a:ext uri="{28A0092B-C50C-407E-A947-70E740481C1C}">
+                <a14:useLocalDpi xmlns:a14="http://schemas.microsoft.com/office/drawing/2010/main" val="0"/>
+              </a:ext>
+            </a:extLst>
+          </a:blip>
+          <a:srcRect/>
+          <a:stretch>
+            <a:fillRect/>
+          </a:stretch>
+        </p:blipFill>
+        <p:spPr bwMode="auto">
+          <a:xfrm>
+            <a:off x="838200" y="1649691"/>
+            <a:ext cx="10731500" cy="4800600"/>
+          </a:xfrm>
+          <a:prstGeom prst="rect">
+            <a:avLst/>
+          </a:prstGeom>
+          <a:noFill/>
+          <a:extLst>
+            <a:ext uri="{909E8E84-426E-40DD-AFC4-6F175D3DCCD1}">
+              <a14:hiddenFill xmlns:a14="http://schemas.microsoft.com/office/drawing/2010/main">
+                <a:solidFill>
+                  <a:srgbClr val="FFFFFF"/>
+                </a:solidFill>
+              </a14:hiddenFill>
+            </a:ext>
+          </a:extLst>
+        </p:spPr>
+      </p:pic>
     </p:spTree>
     <p:extLst>
       <p:ext uri="{BB962C8B-B14F-4D97-AF65-F5344CB8AC3E}">
-        <p14:creationId xmlns:p14="http://schemas.microsoft.com/office/powerpoint/2010/main" val="1518478222"/>
+        <p14:creationId xmlns:p14="http://schemas.microsoft.com/office/powerpoint/2010/main" val="3768205480"/>
       </p:ext>
     </p:extLst>
   </p:cSld>
@@ -7041,7 +7036,7 @@
           <p:cNvPr id="2" name="Title 1">
             <a:extLst>
               <a:ext uri="{FF2B5EF4-FFF2-40B4-BE49-F238E27FC236}">
-                <a16:creationId xmlns:a16="http://schemas.microsoft.com/office/drawing/2014/main" id="{95073D3B-2AE5-9643-9641-1D32C64D80FC}"/>
+                <a16:creationId xmlns:a16="http://schemas.microsoft.com/office/drawing/2014/main" id="{D9EC648D-1595-7748-95BC-8F62875BA7C2}"/>
               </a:ext>
             </a:extLst>
           </p:cNvPr>
@@ -7058,8 +7053,20 @@
           <a:lstStyle/>
           <a:p>
             <a:r>
-              <a:rPr lang="cs-CZ" dirty="0" err="1"/>
-              <a:t>Classification</a:t>
+              <a:rPr lang="cs-CZ" dirty="0"/>
+              <a:t>DL </a:t>
+            </a:r>
+            <a:r>
+              <a:rPr lang="cs-CZ" dirty="0" err="1"/>
+              <a:t>usual</a:t>
+            </a:r>
+            <a:r>
+              <a:rPr lang="cs-CZ" dirty="0"/>
+              <a:t> </a:t>
+            </a:r>
+            <a:r>
+              <a:rPr lang="cs-CZ" dirty="0" err="1"/>
+              <a:t>tasks</a:t>
             </a:r>
             <a:endParaRPr lang="cs-CZ" dirty="0"/>
           </a:p>
@@ -7070,7 +7077,7 @@
           <p:cNvPr id="3" name="Content Placeholder 2">
             <a:extLst>
               <a:ext uri="{FF2B5EF4-FFF2-40B4-BE49-F238E27FC236}">
-                <a16:creationId xmlns:a16="http://schemas.microsoft.com/office/drawing/2014/main" id="{30FB78A9-51B4-5647-82B7-38362EDFD895}"/>
+                <a16:creationId xmlns:a16="http://schemas.microsoft.com/office/drawing/2014/main" id="{92C27B3F-14D8-6449-9365-8DEA34CE97E4}"/>
               </a:ext>
             </a:extLst>
           </p:cNvPr>
@@ -7083,19 +7090,36 @@
         </p:nvSpPr>
         <p:spPr/>
         <p:txBody>
-          <a:bodyPr>
-            <a:normAutofit fontScale="70000" lnSpcReduction="20000"/>
-          </a:bodyPr>
+          <a:bodyPr/>
           <a:lstStyle/>
           <a:p>
             <a:pPr>
               <a:lnSpc>
-                <a:spcPct val="160000"/>
+                <a:spcPct val="150000"/>
               </a:lnSpc>
             </a:pPr>
             <a:r>
-              <a:rPr lang="cs-CZ" dirty="0" err="1"/>
-              <a:t>Supervised</a:t>
+              <a:rPr lang="cs-CZ" dirty="0"/>
+              <a:t>spam </a:t>
+            </a:r>
+            <a:r>
+              <a:rPr lang="cs-CZ" dirty="0" err="1"/>
+              <a:t>filter</a:t>
+            </a:r>
+            <a:r>
+              <a:rPr lang="cs-CZ" dirty="0"/>
+              <a:t> – spam / not spam</a:t>
+            </a:r>
+          </a:p>
+          <a:p>
+            <a:pPr>
+              <a:lnSpc>
+                <a:spcPct val="150000"/>
+              </a:lnSpc>
+            </a:pPr>
+            <a:r>
+              <a:rPr lang="cs-CZ" dirty="0" err="1"/>
+              <a:t>recognize</a:t>
             </a:r>
             <a:r>
               <a:rPr lang="cs-CZ" dirty="0"/>
@@ -7103,23 +7127,43 @@
             </a:r>
             <a:r>
               <a:rPr lang="cs-CZ" dirty="0" err="1"/>
-              <a:t>learning</a:t>
+              <a:t>facial</a:t>
+            </a:r>
+            <a:r>
+              <a:rPr lang="cs-CZ" dirty="0"/>
+              <a:t> </a:t>
+            </a:r>
+            <a:r>
+              <a:rPr lang="cs-CZ" dirty="0" err="1"/>
+              <a:t>expressions</a:t>
+            </a:r>
+            <a:r>
+              <a:rPr lang="cs-CZ" dirty="0"/>
+              <a:t> – </a:t>
+            </a:r>
+            <a:r>
+              <a:rPr lang="cs-CZ" dirty="0" err="1"/>
+              <a:t>angry</a:t>
+            </a:r>
+            <a:r>
+              <a:rPr lang="cs-CZ" dirty="0"/>
+              <a:t> / </a:t>
+            </a:r>
+            <a:r>
+              <a:rPr lang="cs-CZ" dirty="0" err="1"/>
+              <a:t>joyful</a:t>
             </a:r>
             <a:endParaRPr lang="cs-CZ" dirty="0"/>
           </a:p>
           <a:p>
             <a:pPr>
               <a:lnSpc>
-                <a:spcPct val="160000"/>
+                <a:spcPct val="150000"/>
               </a:lnSpc>
             </a:pPr>
             <a:r>
-              <a:rPr lang="cs-CZ" dirty="0"/>
-              <a:t>Transfer </a:t>
-            </a:r>
-            <a:r>
-              <a:rPr lang="cs-CZ" dirty="0" err="1"/>
-              <a:t>human</a:t>
+              <a:rPr lang="cs-CZ" dirty="0" err="1"/>
+              <a:t>recognize</a:t>
             </a:r>
             <a:r>
               <a:rPr lang="cs-CZ" dirty="0"/>
@@ -7127,7 +7171,22 @@
             </a:r>
             <a:r>
               <a:rPr lang="cs-CZ" dirty="0" err="1"/>
-              <a:t>knowledge</a:t>
+              <a:t>gesture</a:t>
+            </a:r>
+            <a:r>
+              <a:rPr lang="cs-CZ" dirty="0"/>
+              <a:t> in video</a:t>
+            </a:r>
+          </a:p>
+          <a:p>
+            <a:pPr>
+              <a:lnSpc>
+                <a:spcPct val="150000"/>
+              </a:lnSpc>
+            </a:pPr>
+            <a:r>
+              <a:rPr lang="cs-CZ" dirty="0" err="1"/>
+              <a:t>identify</a:t>
             </a:r>
             <a:r>
               <a:rPr lang="cs-CZ" dirty="0"/>
@@ -7135,7 +7194,30 @@
             </a:r>
             <a:r>
               <a:rPr lang="cs-CZ" dirty="0" err="1"/>
-              <a:t>into</a:t>
+              <a:t>objects</a:t>
+            </a:r>
+            <a:r>
+              <a:rPr lang="cs-CZ" dirty="0"/>
+              <a:t> in </a:t>
+            </a:r>
+            <a:r>
+              <a:rPr lang="cs-CZ" dirty="0" err="1"/>
+              <a:t>images</a:t>
+            </a:r>
+            <a:r>
+              <a:rPr lang="cs-CZ" dirty="0"/>
+              <a:t> – stop sign, car, …</a:t>
+            </a:r>
+          </a:p>
+          <a:p>
+            <a:pPr>
+              <a:lnSpc>
+                <a:spcPct val="150000"/>
+              </a:lnSpc>
+            </a:pPr>
+            <a:r>
+              <a:rPr lang="cs-CZ" dirty="0" err="1"/>
+              <a:t>detect</a:t>
             </a:r>
             <a:r>
               <a:rPr lang="cs-CZ" dirty="0"/>
@@ -7143,19 +7225,15 @@
             </a:r>
             <a:r>
               <a:rPr lang="cs-CZ" dirty="0" err="1"/>
-              <a:t>dataset</a:t>
-            </a:r>
-            <a:endParaRPr lang="cs-CZ" dirty="0"/>
-          </a:p>
-          <a:p>
-            <a:pPr>
-              <a:lnSpc>
-                <a:spcPct val="160000"/>
-              </a:lnSpc>
-            </a:pPr>
-            <a:r>
-              <a:rPr lang="cs-CZ" dirty="0" err="1"/>
-              <a:t>Manual</a:t>
+              <a:t>voices</a:t>
+            </a:r>
+            <a:r>
+              <a:rPr lang="cs-CZ" dirty="0"/>
+              <a:t> – </a:t>
+            </a:r>
+            <a:r>
+              <a:rPr lang="cs-CZ" dirty="0" err="1"/>
+              <a:t>identify</a:t>
             </a:r>
             <a:r>
               <a:rPr lang="cs-CZ" dirty="0"/>
@@ -7163,7 +7241,15 @@
             </a:r>
             <a:r>
               <a:rPr lang="cs-CZ" dirty="0" err="1"/>
-              <a:t>labeling</a:t>
+              <a:t>speaker</a:t>
+            </a:r>
+            <a:r>
+              <a:rPr lang="cs-CZ" dirty="0"/>
+              <a:t>, </a:t>
+            </a:r>
+            <a:r>
+              <a:rPr lang="cs-CZ" dirty="0" err="1"/>
+              <a:t>transcribe</a:t>
             </a:r>
             <a:r>
               <a:rPr lang="cs-CZ" dirty="0"/>
@@ -7171,223 +7257,19 @@
             </a:r>
             <a:r>
               <a:rPr lang="cs-CZ" dirty="0" err="1"/>
-              <a:t>of</a:t>
-            </a:r>
-            <a:r>
-              <a:rPr lang="cs-CZ" dirty="0"/>
-              <a:t> data</a:t>
-            </a:r>
-          </a:p>
-          <a:p>
-            <a:pPr>
-              <a:lnSpc>
-                <a:spcPct val="160000"/>
-              </a:lnSpc>
-            </a:pPr>
-            <a:r>
-              <a:rPr lang="cs-CZ" dirty="0" err="1"/>
-              <a:t>Tasks</a:t>
-            </a:r>
-            <a:r>
-              <a:rPr lang="cs-CZ" dirty="0"/>
-              <a:t>:</a:t>
-            </a:r>
-          </a:p>
-          <a:p>
-            <a:pPr lvl="1">
-              <a:lnSpc>
-                <a:spcPct val="160000"/>
-              </a:lnSpc>
-            </a:pPr>
-            <a:r>
-              <a:rPr lang="cs-CZ" dirty="0"/>
-              <a:t>spam </a:t>
-            </a:r>
-            <a:r>
-              <a:rPr lang="cs-CZ" dirty="0" err="1"/>
-              <a:t>filter</a:t>
-            </a:r>
-            <a:r>
-              <a:rPr lang="cs-CZ" dirty="0"/>
-              <a:t> – spam / not spam</a:t>
-            </a:r>
-          </a:p>
-          <a:p>
-            <a:pPr lvl="1">
-              <a:lnSpc>
-                <a:spcPct val="160000"/>
-              </a:lnSpc>
-            </a:pPr>
-            <a:r>
-              <a:rPr lang="cs-CZ" dirty="0" err="1"/>
-              <a:t>recognize</a:t>
-            </a:r>
-            <a:r>
-              <a:rPr lang="cs-CZ" dirty="0"/>
-              <a:t> </a:t>
-            </a:r>
-            <a:r>
-              <a:rPr lang="cs-CZ" dirty="0" err="1"/>
-              <a:t>facial</a:t>
-            </a:r>
-            <a:r>
-              <a:rPr lang="cs-CZ" dirty="0"/>
-              <a:t> </a:t>
-            </a:r>
-            <a:r>
-              <a:rPr lang="cs-CZ" dirty="0" err="1"/>
-              <a:t>expressions</a:t>
-            </a:r>
-            <a:r>
-              <a:rPr lang="cs-CZ" dirty="0"/>
-              <a:t> – </a:t>
-            </a:r>
-            <a:r>
-              <a:rPr lang="cs-CZ" dirty="0" err="1"/>
-              <a:t>angry</a:t>
-            </a:r>
-            <a:r>
-              <a:rPr lang="cs-CZ" dirty="0"/>
-              <a:t> / </a:t>
-            </a:r>
-            <a:r>
-              <a:rPr lang="cs-CZ" dirty="0" err="1"/>
-              <a:t>joyful</a:t>
-            </a:r>
-            <a:endParaRPr lang="cs-CZ" dirty="0"/>
-          </a:p>
-          <a:p>
-            <a:pPr lvl="1">
-              <a:lnSpc>
-                <a:spcPct val="160000"/>
-              </a:lnSpc>
-            </a:pPr>
-            <a:r>
-              <a:rPr lang="cs-CZ" dirty="0" err="1"/>
-              <a:t>recognize</a:t>
-            </a:r>
-            <a:r>
-              <a:rPr lang="cs-CZ" dirty="0"/>
-              <a:t> </a:t>
-            </a:r>
-            <a:r>
-              <a:rPr lang="cs-CZ" dirty="0" err="1"/>
-              <a:t>gesture</a:t>
-            </a:r>
-            <a:r>
-              <a:rPr lang="cs-CZ" dirty="0"/>
-              <a:t> in video</a:t>
-            </a:r>
-          </a:p>
-          <a:p>
-            <a:pPr lvl="1">
-              <a:lnSpc>
-                <a:spcPct val="160000"/>
-              </a:lnSpc>
-            </a:pPr>
-            <a:r>
-              <a:rPr lang="cs-CZ" dirty="0" err="1"/>
-              <a:t>rdentify</a:t>
-            </a:r>
-            <a:r>
-              <a:rPr lang="cs-CZ" dirty="0"/>
-              <a:t> </a:t>
-            </a:r>
-            <a:r>
-              <a:rPr lang="cs-CZ" dirty="0" err="1"/>
-              <a:t>objects</a:t>
-            </a:r>
-            <a:r>
-              <a:rPr lang="cs-CZ" dirty="0"/>
-              <a:t> in </a:t>
-            </a:r>
-            <a:r>
-              <a:rPr lang="cs-CZ" dirty="0" err="1"/>
-              <a:t>images</a:t>
-            </a:r>
-            <a:r>
-              <a:rPr lang="cs-CZ" dirty="0"/>
-              <a:t> – stop sign, car, …</a:t>
-            </a:r>
-          </a:p>
-          <a:p>
-            <a:pPr lvl="1">
-              <a:lnSpc>
-                <a:spcPct val="160000"/>
-              </a:lnSpc>
-            </a:pPr>
-            <a:r>
-              <a:rPr lang="cs-CZ" dirty="0" err="1"/>
-              <a:t>detect</a:t>
-            </a:r>
-            <a:r>
-              <a:rPr lang="cs-CZ" dirty="0"/>
-              <a:t> </a:t>
-            </a:r>
-            <a:r>
-              <a:rPr lang="cs-CZ" dirty="0" err="1"/>
-              <a:t>voices</a:t>
-            </a:r>
-            <a:r>
-              <a:rPr lang="cs-CZ" dirty="0"/>
-              <a:t> – </a:t>
-            </a:r>
-            <a:r>
-              <a:rPr lang="cs-CZ" dirty="0" err="1"/>
-              <a:t>identify</a:t>
-            </a:r>
-            <a:r>
-              <a:rPr lang="cs-CZ" dirty="0"/>
-              <a:t> </a:t>
-            </a:r>
-            <a:r>
-              <a:rPr lang="cs-CZ" dirty="0" err="1"/>
-              <a:t>speaker</a:t>
-            </a:r>
-            <a:r>
-              <a:rPr lang="cs-CZ" dirty="0"/>
-              <a:t>, </a:t>
-            </a:r>
-            <a:r>
-              <a:rPr lang="cs-CZ" dirty="0" err="1"/>
-              <a:t>transcribe</a:t>
-            </a:r>
-            <a:r>
-              <a:rPr lang="cs-CZ" dirty="0"/>
-              <a:t> </a:t>
-            </a:r>
-            <a:r>
-              <a:rPr lang="cs-CZ" dirty="0" err="1"/>
               <a:t>voice</a:t>
             </a:r>
             <a:r>
               <a:rPr lang="cs-CZ" dirty="0"/>
               <a:t> to text</a:t>
             </a:r>
-          </a:p>
-          <a:p>
-            <a:pPr lvl="1"/>
-            <a:endParaRPr lang="cs-CZ" dirty="0"/>
-          </a:p>
-          <a:p>
-            <a:endParaRPr lang="cs-CZ" dirty="0"/>
-          </a:p>
-          <a:p>
-            <a:endParaRPr lang="cs-CZ" dirty="0"/>
-          </a:p>
-          <a:p>
-            <a:pPr marL="514350" indent="-514350">
-              <a:buFont typeface="+mj-lt"/>
-              <a:buAutoNum type="arabicPeriod"/>
-            </a:pPr>
-            <a:endParaRPr lang="cs-CZ" dirty="0"/>
           </a:p>
         </p:txBody>
       </p:sp>
     </p:spTree>
     <p:extLst>
       <p:ext uri="{BB962C8B-B14F-4D97-AF65-F5344CB8AC3E}">
-        <p14:creationId xmlns:p14="http://schemas.microsoft.com/office/powerpoint/2010/main" val="3381581791"/>
+        <p14:creationId xmlns:p14="http://schemas.microsoft.com/office/powerpoint/2010/main" val="3756645248"/>
       </p:ext>
     </p:extLst>
   </p:cSld>
@@ -7419,7 +7301,7 @@
           <p:cNvPr id="2" name="Title 1">
             <a:extLst>
               <a:ext uri="{FF2B5EF4-FFF2-40B4-BE49-F238E27FC236}">
-                <a16:creationId xmlns:a16="http://schemas.microsoft.com/office/drawing/2014/main" id="{348215C5-D4DD-FC4F-B13F-CD815BC94A3F}"/>
+                <a16:creationId xmlns:a16="http://schemas.microsoft.com/office/drawing/2014/main" id="{F95FF109-2ED4-E342-9B38-849CE97CD066}"/>
               </a:ext>
             </a:extLst>
           </p:cNvPr>
@@ -7437,12 +7319,9 @@
           <a:p>
             <a:r>
               <a:rPr lang="cs-CZ" dirty="0" err="1"/>
-              <a:t>Implementation</a:t>
-            </a:r>
-            <a:r>
-              <a:rPr lang="cs-CZ" dirty="0"/>
-              <a:t> - SL</a:t>
-            </a:r>
+              <a:t>Clustering</a:t>
+            </a:r>
+            <a:endParaRPr lang="cs-CZ" dirty="0"/>
           </a:p>
         </p:txBody>
       </p:sp>
@@ -7451,7 +7330,7 @@
           <p:cNvPr id="3" name="Content Placeholder 2">
             <a:extLst>
               <a:ext uri="{FF2B5EF4-FFF2-40B4-BE49-F238E27FC236}">
-                <a16:creationId xmlns:a16="http://schemas.microsoft.com/office/drawing/2014/main" id="{10C5E9A3-43F4-AD43-85D4-87086E6C6173}"/>
+                <a16:creationId xmlns:a16="http://schemas.microsoft.com/office/drawing/2014/main" id="{11D1657F-54AD-F445-AB3D-C788DAE2CC0F}"/>
               </a:ext>
             </a:extLst>
           </p:cNvPr>
@@ -7464,195 +7343,63 @@
         </p:nvSpPr>
         <p:spPr/>
         <p:txBody>
-          <a:bodyPr>
-            <a:normAutofit lnSpcReduction="10000"/>
-          </a:bodyPr>
+          <a:bodyPr/>
           <a:lstStyle/>
           <a:p>
-            <a:pPr marL="514350" indent="-514350">
-              <a:lnSpc>
-                <a:spcPct val="150000"/>
-              </a:lnSpc>
-              <a:buFont typeface="+mj-lt"/>
-              <a:buAutoNum type="arabicPeriod"/>
-            </a:pPr>
-            <a:r>
-              <a:rPr lang="cs-CZ" dirty="0" err="1"/>
-              <a:t>Get</a:t>
-            </a:r>
-            <a:r>
-              <a:rPr lang="cs-CZ" dirty="0"/>
-              <a:t> </a:t>
-            </a:r>
-            <a:r>
-              <a:rPr lang="cs-CZ" dirty="0" err="1"/>
-              <a:t>dataset</a:t>
-            </a:r>
-            <a:endParaRPr lang="cs-CZ" dirty="0"/>
-          </a:p>
-          <a:p>
-            <a:pPr marL="514350" indent="-514350">
-              <a:lnSpc>
-                <a:spcPct val="150000"/>
-              </a:lnSpc>
-              <a:buFont typeface="+mj-lt"/>
-              <a:buAutoNum type="arabicPeriod"/>
-            </a:pPr>
-            <a:r>
-              <a:rPr lang="cs-CZ" dirty="0"/>
-              <a:t>Split </a:t>
-            </a:r>
-            <a:r>
-              <a:rPr lang="cs-CZ" dirty="0" err="1"/>
-              <a:t>dataset</a:t>
-            </a:r>
-            <a:r>
-              <a:rPr lang="cs-CZ" dirty="0"/>
-              <a:t> 80/20 </a:t>
-            </a:r>
-            <a:r>
-              <a:rPr lang="cs-CZ" dirty="0" err="1"/>
-              <a:t>or</a:t>
-            </a:r>
-            <a:r>
-              <a:rPr lang="cs-CZ" dirty="0"/>
-              <a:t> 90/10</a:t>
-            </a:r>
-          </a:p>
-          <a:p>
-            <a:pPr marL="514350" indent="-514350">
-              <a:lnSpc>
-                <a:spcPct val="150000"/>
-              </a:lnSpc>
-              <a:buFont typeface="+mj-lt"/>
-              <a:buAutoNum type="arabicPeriod"/>
-            </a:pPr>
-            <a:r>
-              <a:rPr lang="cs-CZ" dirty="0" err="1"/>
-              <a:t>Train</a:t>
-            </a:r>
-            <a:r>
-              <a:rPr lang="cs-CZ" dirty="0"/>
-              <a:t> (</a:t>
-            </a:r>
-            <a:r>
-              <a:rPr lang="cs-CZ" dirty="0" err="1"/>
-              <a:t>dataset</a:t>
-            </a:r>
-            <a:r>
-              <a:rPr lang="cs-CZ" dirty="0"/>
-              <a:t> 80)</a:t>
-            </a:r>
-          </a:p>
-          <a:p>
-            <a:pPr marL="514350" indent="-514350">
-              <a:lnSpc>
-                <a:spcPct val="150000"/>
-              </a:lnSpc>
-              <a:buFont typeface="+mj-lt"/>
-              <a:buAutoNum type="arabicPeriod"/>
-            </a:pPr>
-            <a:r>
-              <a:rPr lang="cs-CZ" dirty="0" err="1"/>
-              <a:t>Validate</a:t>
-            </a:r>
-            <a:r>
-              <a:rPr lang="cs-CZ" dirty="0"/>
-              <a:t> (</a:t>
-            </a:r>
-            <a:r>
-              <a:rPr lang="cs-CZ" dirty="0" err="1"/>
-              <a:t>datase</a:t>
-            </a:r>
-            <a:r>
-              <a:rPr lang="cs-CZ" dirty="0"/>
-              <a:t> 20)</a:t>
-            </a:r>
-          </a:p>
-          <a:p>
-            <a:pPr marL="514350" indent="-514350">
-              <a:lnSpc>
-                <a:spcPct val="150000"/>
-              </a:lnSpc>
-              <a:buFont typeface="+mj-lt"/>
-              <a:buAutoNum type="arabicPeriod"/>
-            </a:pPr>
-            <a:r>
-              <a:rPr lang="cs-CZ" dirty="0" err="1"/>
-              <a:t>Execute</a:t>
-            </a:r>
-            <a:endParaRPr lang="cs-CZ" dirty="0"/>
-          </a:p>
-          <a:p>
-            <a:pPr marL="514350" indent="-514350">
-              <a:lnSpc>
-                <a:spcPct val="150000"/>
-              </a:lnSpc>
-              <a:buFont typeface="+mj-lt"/>
-              <a:buAutoNum type="arabicPeriod"/>
-            </a:pPr>
-            <a:r>
-              <a:rPr lang="cs-CZ" dirty="0" err="1"/>
-              <a:t>Train</a:t>
-            </a:r>
-            <a:r>
-              <a:rPr lang="cs-CZ" dirty="0"/>
-              <a:t> </a:t>
-            </a:r>
-            <a:r>
-              <a:rPr lang="cs-CZ" dirty="0" err="1"/>
-              <a:t>again</a:t>
-            </a:r>
-            <a:r>
-              <a:rPr lang="cs-CZ" dirty="0"/>
-              <a:t> – </a:t>
-            </a:r>
-            <a:r>
-              <a:rPr lang="cs-CZ" dirty="0" err="1"/>
-              <a:t>collect</a:t>
-            </a:r>
-            <a:r>
-              <a:rPr lang="cs-CZ" dirty="0"/>
-              <a:t> data </a:t>
-            </a:r>
-            <a:r>
-              <a:rPr lang="cs-CZ" dirty="0" err="1"/>
-              <a:t>for</a:t>
-            </a:r>
-            <a:r>
-              <a:rPr lang="cs-CZ" dirty="0"/>
-              <a:t> </a:t>
-            </a:r>
-            <a:r>
-              <a:rPr lang="cs-CZ" dirty="0" err="1"/>
-              <a:t>further</a:t>
-            </a:r>
-            <a:r>
-              <a:rPr lang="cs-CZ" dirty="0"/>
-              <a:t> </a:t>
-            </a:r>
-            <a:r>
-              <a:rPr lang="cs-CZ" dirty="0" err="1"/>
-              <a:t>training</a:t>
-            </a:r>
-            <a:endParaRPr lang="cs-CZ" dirty="0"/>
-          </a:p>
-          <a:p>
-            <a:pPr marL="514350" indent="-514350">
-              <a:buFont typeface="+mj-lt"/>
-              <a:buAutoNum type="arabicPeriod"/>
-            </a:pPr>
-            <a:endParaRPr lang="cs-CZ" dirty="0"/>
-          </a:p>
-          <a:p>
-            <a:endParaRPr lang="cs-CZ" dirty="0"/>
+            <a:r>
+              <a:rPr lang="en-US" dirty="0"/>
+              <a:t>Unsupervised learning</a:t>
+            </a:r>
+          </a:p>
+          <a:p>
+            <a:r>
+              <a:rPr lang="en-US" dirty="0"/>
+              <a:t>Learning without labels</a:t>
+            </a:r>
+          </a:p>
+          <a:p>
+            <a:r>
+              <a:rPr lang="en-US" dirty="0"/>
+              <a:t>Tasks:</a:t>
+            </a:r>
+          </a:p>
+          <a:p>
+            <a:pPr lvl="1"/>
+            <a:r>
+              <a:rPr lang="en-US" dirty="0"/>
+              <a:t>comparing documents</a:t>
+            </a:r>
+          </a:p>
+          <a:p>
+            <a:pPr lvl="1"/>
+            <a:r>
+              <a:rPr lang="en-US" dirty="0"/>
+              <a:t>finding similar items</a:t>
+            </a:r>
+          </a:p>
+          <a:p>
+            <a:pPr lvl="1"/>
+            <a:r>
+              <a:rPr lang="en-US" dirty="0"/>
+              <a:t>anomalies detection</a:t>
+            </a:r>
+          </a:p>
+          <a:p>
+            <a:pPr lvl="1"/>
+            <a:r>
+              <a:rPr lang="en-US" dirty="0"/>
+              <a:t>unusual behavior – fraud detection</a:t>
+            </a:r>
+          </a:p>
+          <a:p>
+            <a:endParaRPr lang="en-US" dirty="0"/>
           </a:p>
         </p:txBody>
       </p:sp>
     </p:spTree>
     <p:extLst>
       <p:ext uri="{BB962C8B-B14F-4D97-AF65-F5344CB8AC3E}">
-        <p14:creationId xmlns:p14="http://schemas.microsoft.com/office/powerpoint/2010/main" val="283369796"/>
+        <p14:creationId xmlns:p14="http://schemas.microsoft.com/office/powerpoint/2010/main" val="1518478222"/>
       </p:ext>
     </p:extLst>
   </p:cSld>
@@ -7684,7 +7431,7 @@
           <p:cNvPr id="2" name="Title 1">
             <a:extLst>
               <a:ext uri="{FF2B5EF4-FFF2-40B4-BE49-F238E27FC236}">
-                <a16:creationId xmlns:a16="http://schemas.microsoft.com/office/drawing/2014/main" id="{729859E7-1062-2C4A-8536-255793F51658}"/>
+                <a16:creationId xmlns:a16="http://schemas.microsoft.com/office/drawing/2014/main" id="{95073D3B-2AE5-9643-9641-1D32C64D80FC}"/>
               </a:ext>
             </a:extLst>
           </p:cNvPr>
@@ -7701,12 +7448,8 @@
           <a:lstStyle/>
           <a:p>
             <a:r>
-              <a:rPr lang="cs-CZ" dirty="0"/>
-              <a:t>AI &amp; </a:t>
-            </a:r>
-            <a:r>
-              <a:rPr lang="cs-CZ" dirty="0" err="1"/>
-              <a:t>banking</a:t>
+              <a:rPr lang="cs-CZ" dirty="0" err="1"/>
+              <a:t>Classification</a:t>
             </a:r>
             <a:endParaRPr lang="cs-CZ" dirty="0"/>
           </a:p>
@@ -7717,7 +7460,7 @@
           <p:cNvPr id="3" name="Content Placeholder 2">
             <a:extLst>
               <a:ext uri="{FF2B5EF4-FFF2-40B4-BE49-F238E27FC236}">
-                <a16:creationId xmlns:a16="http://schemas.microsoft.com/office/drawing/2014/main" id="{945FEAC9-989A-CC47-A49C-7D7031A8D2C9}"/>
+                <a16:creationId xmlns:a16="http://schemas.microsoft.com/office/drawing/2014/main" id="{30FB78A9-51B4-5647-82B7-38362EDFD895}"/>
               </a:ext>
             </a:extLst>
           </p:cNvPr>
@@ -7730,28 +7473,43 @@
         </p:nvSpPr>
         <p:spPr/>
         <p:txBody>
-          <a:bodyPr/>
+          <a:bodyPr>
+            <a:normAutofit fontScale="70000" lnSpcReduction="20000"/>
+          </a:bodyPr>
           <a:lstStyle/>
           <a:p>
             <a:pPr>
               <a:lnSpc>
-                <a:spcPct val="150000"/>
+                <a:spcPct val="160000"/>
               </a:lnSpc>
             </a:pPr>
             <a:r>
+              <a:rPr lang="cs-CZ" dirty="0" err="1"/>
+              <a:t>Supervised</a:t>
+            </a:r>
+            <a:r>
               <a:rPr lang="cs-CZ" dirty="0"/>
-              <a:t>PFM</a:t>
-            </a:r>
+              <a:t> </a:t>
+            </a:r>
+            <a:r>
+              <a:rPr lang="cs-CZ" dirty="0" err="1"/>
+              <a:t>learning</a:t>
+            </a:r>
+            <a:endParaRPr lang="cs-CZ" dirty="0"/>
           </a:p>
           <a:p>
             <a:pPr>
               <a:lnSpc>
-                <a:spcPct val="150000"/>
+                <a:spcPct val="160000"/>
               </a:lnSpc>
             </a:pPr>
             <a:r>
-              <a:rPr lang="cs-CZ" dirty="0" err="1"/>
-              <a:t>Fraud</a:t>
+              <a:rPr lang="cs-CZ" dirty="0"/>
+              <a:t>Transfer </a:t>
+            </a:r>
+            <a:r>
+              <a:rPr lang="cs-CZ" dirty="0" err="1"/>
+              <a:t>human</a:t>
             </a:r>
             <a:r>
               <a:rPr lang="cs-CZ" dirty="0"/>
@@ -7759,19 +7517,35 @@
             </a:r>
             <a:r>
               <a:rPr lang="cs-CZ" dirty="0" err="1"/>
-              <a:t>protection</a:t>
+              <a:t>knowledge</a:t>
+            </a:r>
+            <a:r>
+              <a:rPr lang="cs-CZ" dirty="0"/>
+              <a:t> </a:t>
+            </a:r>
+            <a:r>
+              <a:rPr lang="cs-CZ" dirty="0" err="1"/>
+              <a:t>into</a:t>
+            </a:r>
+            <a:r>
+              <a:rPr lang="cs-CZ" dirty="0"/>
+              <a:t> </a:t>
+            </a:r>
+            <a:r>
+              <a:rPr lang="cs-CZ" dirty="0" err="1"/>
+              <a:t>dataset</a:t>
             </a:r>
             <a:endParaRPr lang="cs-CZ" dirty="0"/>
           </a:p>
           <a:p>
             <a:pPr>
               <a:lnSpc>
-                <a:spcPct val="150000"/>
+                <a:spcPct val="160000"/>
               </a:lnSpc>
             </a:pPr>
             <a:r>
               <a:rPr lang="cs-CZ" dirty="0" err="1"/>
-              <a:t>Security</a:t>
+              <a:t>Manual</a:t>
             </a:r>
             <a:r>
               <a:rPr lang="cs-CZ" dirty="0"/>
@@ -7779,7 +7553,80 @@
             </a:r>
             <a:r>
               <a:rPr lang="cs-CZ" dirty="0" err="1"/>
-              <a:t>login</a:t>
+              <a:t>labeling</a:t>
+            </a:r>
+            <a:r>
+              <a:rPr lang="cs-CZ" dirty="0"/>
+              <a:t> </a:t>
+            </a:r>
+            <a:r>
+              <a:rPr lang="cs-CZ" dirty="0" err="1"/>
+              <a:t>of</a:t>
+            </a:r>
+            <a:r>
+              <a:rPr lang="cs-CZ" dirty="0"/>
+              <a:t> data</a:t>
+            </a:r>
+          </a:p>
+          <a:p>
+            <a:pPr>
+              <a:lnSpc>
+                <a:spcPct val="160000"/>
+              </a:lnSpc>
+            </a:pPr>
+            <a:r>
+              <a:rPr lang="cs-CZ" dirty="0" err="1"/>
+              <a:t>Tasks</a:t>
+            </a:r>
+            <a:r>
+              <a:rPr lang="cs-CZ" dirty="0"/>
+              <a:t>:</a:t>
+            </a:r>
+          </a:p>
+          <a:p>
+            <a:pPr lvl="1">
+              <a:lnSpc>
+                <a:spcPct val="160000"/>
+              </a:lnSpc>
+            </a:pPr>
+            <a:r>
+              <a:rPr lang="cs-CZ" dirty="0"/>
+              <a:t>spam </a:t>
+            </a:r>
+            <a:r>
+              <a:rPr lang="cs-CZ" dirty="0" err="1"/>
+              <a:t>filter</a:t>
+            </a:r>
+            <a:r>
+              <a:rPr lang="cs-CZ" dirty="0"/>
+              <a:t> – spam / not spam</a:t>
+            </a:r>
+          </a:p>
+          <a:p>
+            <a:pPr lvl="1">
+              <a:lnSpc>
+                <a:spcPct val="160000"/>
+              </a:lnSpc>
+            </a:pPr>
+            <a:r>
+              <a:rPr lang="cs-CZ" dirty="0" err="1"/>
+              <a:t>recognize</a:t>
+            </a:r>
+            <a:r>
+              <a:rPr lang="cs-CZ" dirty="0"/>
+              <a:t> </a:t>
+            </a:r>
+            <a:r>
+              <a:rPr lang="cs-CZ" dirty="0" err="1"/>
+              <a:t>facial</a:t>
+            </a:r>
+            <a:r>
+              <a:rPr lang="cs-CZ" dirty="0"/>
+              <a:t> </a:t>
+            </a:r>
+            <a:r>
+              <a:rPr lang="cs-CZ" dirty="0" err="1"/>
+              <a:t>expressions</a:t>
             </a:r>
             <a:r>
               <a:rPr lang="cs-CZ" dirty="0"/>
@@ -7787,22 +7634,27 @@
             </a:r>
             <a:r>
               <a:rPr lang="cs-CZ" dirty="0" err="1"/>
-              <a:t>Fingerprint</a:t>
+              <a:t>angry</a:t>
             </a:r>
             <a:r>
               <a:rPr lang="cs-CZ" dirty="0"/>
-              <a:t>, Face ID …</a:t>
-            </a:r>
-          </a:p>
-          <a:p>
-            <a:pPr>
+              <a:t> / </a:t>
+            </a:r>
+            <a:r>
+              <a:rPr lang="cs-CZ" dirty="0" err="1"/>
+              <a:t>joyful</a:t>
+            </a:r>
+            <a:endParaRPr lang="cs-CZ" dirty="0"/>
+          </a:p>
+          <a:p>
+            <a:pPr lvl="1">
               <a:lnSpc>
-                <a:spcPct val="150000"/>
+                <a:spcPct val="160000"/>
               </a:lnSpc>
             </a:pPr>
             <a:r>
               <a:rPr lang="cs-CZ" dirty="0" err="1"/>
-              <a:t>Customer</a:t>
+              <a:t>recognize</a:t>
             </a:r>
             <a:r>
               <a:rPr lang="cs-CZ" dirty="0"/>
@@ -7810,7 +7662,22 @@
             </a:r>
             <a:r>
               <a:rPr lang="cs-CZ" dirty="0" err="1"/>
-              <a:t>service</a:t>
+              <a:t>gesture</a:t>
+            </a:r>
+            <a:r>
+              <a:rPr lang="cs-CZ" dirty="0"/>
+              <a:t> in video</a:t>
+            </a:r>
+          </a:p>
+          <a:p>
+            <a:pPr lvl="1">
+              <a:lnSpc>
+                <a:spcPct val="160000"/>
+              </a:lnSpc>
+            </a:pPr>
+            <a:r>
+              <a:rPr lang="cs-CZ" dirty="0" err="1"/>
+              <a:t>rdentify</a:t>
             </a:r>
             <a:r>
               <a:rPr lang="cs-CZ" dirty="0"/>
@@ -7818,25 +7685,91 @@
             </a:r>
             <a:r>
               <a:rPr lang="cs-CZ" dirty="0" err="1"/>
-              <a:t>automation</a:t>
-            </a:r>
-            <a:endParaRPr lang="cs-CZ" dirty="0"/>
-          </a:p>
-          <a:p>
-            <a:pPr>
+              <a:t>objects</a:t>
+            </a:r>
+            <a:r>
+              <a:rPr lang="cs-CZ" dirty="0"/>
+              <a:t> in </a:t>
+            </a:r>
+            <a:r>
+              <a:rPr lang="cs-CZ" dirty="0" err="1"/>
+              <a:t>images</a:t>
+            </a:r>
+            <a:r>
+              <a:rPr lang="cs-CZ" dirty="0"/>
+              <a:t> – stop sign, car, …</a:t>
+            </a:r>
+          </a:p>
+          <a:p>
+            <a:pPr lvl="1">
               <a:lnSpc>
-                <a:spcPct val="150000"/>
+                <a:spcPct val="160000"/>
               </a:lnSpc>
             </a:pPr>
             <a:r>
+              <a:rPr lang="cs-CZ" dirty="0" err="1"/>
+              <a:t>detect</a:t>
+            </a:r>
+            <a:r>
               <a:rPr lang="cs-CZ" dirty="0"/>
-              <a:t>Chat bot</a:t>
-            </a:r>
-          </a:p>
-          <a:p>
+              <a:t> </a:t>
+            </a:r>
+            <a:r>
+              <a:rPr lang="cs-CZ" dirty="0" err="1"/>
+              <a:t>voices</a:t>
+            </a:r>
+            <a:r>
+              <a:rPr lang="cs-CZ" dirty="0"/>
+              <a:t> – </a:t>
+            </a:r>
+            <a:r>
+              <a:rPr lang="cs-CZ" dirty="0" err="1"/>
+              <a:t>identify</a:t>
+            </a:r>
+            <a:r>
+              <a:rPr lang="cs-CZ" dirty="0"/>
+              <a:t> </a:t>
+            </a:r>
+            <a:r>
+              <a:rPr lang="cs-CZ" dirty="0" err="1"/>
+              <a:t>speaker</a:t>
+            </a:r>
+            <a:r>
+              <a:rPr lang="cs-CZ" dirty="0"/>
+              <a:t>, </a:t>
+            </a:r>
+            <a:r>
+              <a:rPr lang="cs-CZ" dirty="0" err="1"/>
+              <a:t>transcribe</a:t>
+            </a:r>
+            <a:r>
+              <a:rPr lang="cs-CZ" dirty="0"/>
+              <a:t> </a:t>
+            </a:r>
+            <a:r>
+              <a:rPr lang="cs-CZ" dirty="0" err="1"/>
+              <a:t>voice</a:t>
+            </a:r>
+            <a:r>
+              <a:rPr lang="cs-CZ" dirty="0"/>
+              <a:t> to text</a:t>
+            </a:r>
+          </a:p>
+          <a:p>
+            <a:pPr lvl="1"/>
             <a:endParaRPr lang="cs-CZ" dirty="0"/>
           </a:p>
           <a:p>
+            <a:endParaRPr lang="cs-CZ" dirty="0"/>
+          </a:p>
+          <a:p>
+            <a:endParaRPr lang="cs-CZ" dirty="0"/>
+          </a:p>
+          <a:p>
+            <a:pPr marL="514350" indent="-514350">
+              <a:buFont typeface="+mj-lt"/>
+              <a:buAutoNum type="arabicPeriod"/>
+            </a:pPr>
             <a:endParaRPr lang="cs-CZ" dirty="0"/>
           </a:p>
         </p:txBody>
@@ -7844,7 +7777,7 @@
     </p:spTree>
     <p:extLst>
       <p:ext uri="{BB962C8B-B14F-4D97-AF65-F5344CB8AC3E}">
-        <p14:creationId xmlns:p14="http://schemas.microsoft.com/office/powerpoint/2010/main" val="716809081"/>
+        <p14:creationId xmlns:p14="http://schemas.microsoft.com/office/powerpoint/2010/main" val="3381581791"/>
       </p:ext>
     </p:extLst>
   </p:cSld>
@@ -7876,7 +7809,7 @@
           <p:cNvPr id="2" name="Title 1">
             <a:extLst>
               <a:ext uri="{FF2B5EF4-FFF2-40B4-BE49-F238E27FC236}">
-                <a16:creationId xmlns:a16="http://schemas.microsoft.com/office/drawing/2014/main" id="{B29E5387-3D7D-CA46-ABFB-AC087AFF044D}"/>
+                <a16:creationId xmlns:a16="http://schemas.microsoft.com/office/drawing/2014/main" id="{348215C5-D4DD-FC4F-B13F-CD815BC94A3F}"/>
               </a:ext>
             </a:extLst>
           </p:cNvPr>
@@ -7893,8 +7826,12 @@
           <a:lstStyle/>
           <a:p>
             <a:r>
+              <a:rPr lang="cs-CZ" dirty="0" err="1"/>
+              <a:t>Implementation</a:t>
+            </a:r>
+            <a:r>
               <a:rPr lang="cs-CZ" dirty="0"/>
-              <a:t>AI and Java</a:t>
+              <a:t> - SL</a:t>
             </a:r>
           </a:p>
         </p:txBody>
@@ -7904,7 +7841,7 @@
           <p:cNvPr id="3" name="Content Placeholder 2">
             <a:extLst>
               <a:ext uri="{FF2B5EF4-FFF2-40B4-BE49-F238E27FC236}">
-                <a16:creationId xmlns:a16="http://schemas.microsoft.com/office/drawing/2014/main" id="{D3B6E749-500C-5D44-B09E-3B89D2138E86}"/>
+                <a16:creationId xmlns:a16="http://schemas.microsoft.com/office/drawing/2014/main" id="{10C5E9A3-43F4-AD43-85D4-87086E6C6173}"/>
               </a:ext>
             </a:extLst>
           </p:cNvPr>
@@ -7918,87 +7855,183 @@
         <p:spPr/>
         <p:txBody>
           <a:bodyPr>
-            <a:normAutofit/>
+            <a:normAutofit lnSpcReduction="10000"/>
           </a:bodyPr>
           <a:lstStyle/>
           <a:p>
+            <a:pPr marL="514350" indent="-514350">
+              <a:lnSpc>
+                <a:spcPct val="150000"/>
+              </a:lnSpc>
+              <a:buFont typeface="+mj-lt"/>
+              <a:buAutoNum type="arabicPeriod"/>
+            </a:pPr>
+            <a:r>
+              <a:rPr lang="cs-CZ" dirty="0" err="1"/>
+              <a:t>Get</a:t>
+            </a:r>
             <a:r>
               <a:rPr lang="cs-CZ" dirty="0"/>
-              <a:t>Python</a:t>
-            </a:r>
-          </a:p>
-          <a:p>
-            <a:pPr lvl="1"/>
-            <a:r>
-              <a:rPr lang="cs-CZ" dirty="0" err="1"/>
-              <a:t>TensorFlow</a:t>
+              <a:t> </a:t>
+            </a:r>
+            <a:r>
+              <a:rPr lang="cs-CZ" dirty="0" err="1"/>
+              <a:t>dataset</a:t>
             </a:r>
             <a:endParaRPr lang="cs-CZ" dirty="0"/>
           </a:p>
           <a:p>
-            <a:pPr lvl="1"/>
-            <a:r>
-              <a:rPr lang="cs-CZ" dirty="0" err="1"/>
-              <a:t>Theano</a:t>
+            <a:pPr marL="514350" indent="-514350">
+              <a:lnSpc>
+                <a:spcPct val="150000"/>
+              </a:lnSpc>
+              <a:buFont typeface="+mj-lt"/>
+              <a:buAutoNum type="arabicPeriod"/>
+            </a:pPr>
+            <a:r>
+              <a:rPr lang="cs-CZ" dirty="0"/>
+              <a:t>Split </a:t>
+            </a:r>
+            <a:r>
+              <a:rPr lang="cs-CZ" dirty="0" err="1"/>
+              <a:t>dataset</a:t>
+            </a:r>
+            <a:r>
+              <a:rPr lang="cs-CZ" dirty="0"/>
+              <a:t> 80/20 </a:t>
+            </a:r>
+            <a:r>
+              <a:rPr lang="cs-CZ" dirty="0" err="1"/>
+              <a:t>or</a:t>
+            </a:r>
+            <a:r>
+              <a:rPr lang="cs-CZ" dirty="0"/>
+              <a:t> 90/10</a:t>
+            </a:r>
+          </a:p>
+          <a:p>
+            <a:pPr marL="514350" indent="-514350">
+              <a:lnSpc>
+                <a:spcPct val="150000"/>
+              </a:lnSpc>
+              <a:buFont typeface="+mj-lt"/>
+              <a:buAutoNum type="arabicPeriod"/>
+            </a:pPr>
+            <a:r>
+              <a:rPr lang="cs-CZ" dirty="0" err="1"/>
+              <a:t>Train</a:t>
+            </a:r>
+            <a:r>
+              <a:rPr lang="cs-CZ" dirty="0"/>
+              <a:t> (</a:t>
+            </a:r>
+            <a:r>
+              <a:rPr lang="cs-CZ" dirty="0" err="1"/>
+              <a:t>dataset</a:t>
+            </a:r>
+            <a:r>
+              <a:rPr lang="cs-CZ" dirty="0"/>
+              <a:t> 80)</a:t>
+            </a:r>
+          </a:p>
+          <a:p>
+            <a:pPr marL="514350" indent="-514350">
+              <a:lnSpc>
+                <a:spcPct val="150000"/>
+              </a:lnSpc>
+              <a:buFont typeface="+mj-lt"/>
+              <a:buAutoNum type="arabicPeriod"/>
+            </a:pPr>
+            <a:r>
+              <a:rPr lang="cs-CZ" dirty="0" err="1"/>
+              <a:t>Validate</a:t>
+            </a:r>
+            <a:r>
+              <a:rPr lang="cs-CZ" dirty="0"/>
+              <a:t> (</a:t>
+            </a:r>
+            <a:r>
+              <a:rPr lang="cs-CZ" dirty="0" err="1"/>
+              <a:t>datase</a:t>
+            </a:r>
+            <a:r>
+              <a:rPr lang="cs-CZ" dirty="0"/>
+              <a:t> 20)</a:t>
+            </a:r>
+          </a:p>
+          <a:p>
+            <a:pPr marL="514350" indent="-514350">
+              <a:lnSpc>
+                <a:spcPct val="150000"/>
+              </a:lnSpc>
+              <a:buFont typeface="+mj-lt"/>
+              <a:buAutoNum type="arabicPeriod"/>
+            </a:pPr>
+            <a:r>
+              <a:rPr lang="cs-CZ" dirty="0" err="1"/>
+              <a:t>Execute</a:t>
             </a:r>
             <a:endParaRPr lang="cs-CZ" dirty="0"/>
           </a:p>
           <a:p>
-            <a:pPr lvl="1"/>
-            <a:r>
-              <a:rPr lang="cs-CZ" dirty="0" err="1"/>
-              <a:t>Keras</a:t>
+            <a:pPr marL="514350" indent="-514350">
+              <a:lnSpc>
+                <a:spcPct val="150000"/>
+              </a:lnSpc>
+              <a:buFont typeface="+mj-lt"/>
+              <a:buAutoNum type="arabicPeriod"/>
+            </a:pPr>
+            <a:r>
+              <a:rPr lang="cs-CZ" dirty="0" err="1"/>
+              <a:t>Train</a:t>
+            </a:r>
+            <a:r>
+              <a:rPr lang="cs-CZ" dirty="0"/>
+              <a:t> </a:t>
+            </a:r>
+            <a:r>
+              <a:rPr lang="cs-CZ" dirty="0" err="1"/>
+              <a:t>again</a:t>
+            </a:r>
+            <a:r>
+              <a:rPr lang="cs-CZ" dirty="0"/>
+              <a:t> – </a:t>
+            </a:r>
+            <a:r>
+              <a:rPr lang="cs-CZ" dirty="0" err="1"/>
+              <a:t>collect</a:t>
+            </a:r>
+            <a:r>
+              <a:rPr lang="cs-CZ" dirty="0"/>
+              <a:t> data </a:t>
+            </a:r>
+            <a:r>
+              <a:rPr lang="cs-CZ" dirty="0" err="1"/>
+              <a:t>for</a:t>
+            </a:r>
+            <a:r>
+              <a:rPr lang="cs-CZ" dirty="0"/>
+              <a:t> </a:t>
+            </a:r>
+            <a:r>
+              <a:rPr lang="cs-CZ" dirty="0" err="1"/>
+              <a:t>further</a:t>
+            </a:r>
+            <a:r>
+              <a:rPr lang="cs-CZ" dirty="0"/>
+              <a:t> </a:t>
+            </a:r>
+            <a:r>
+              <a:rPr lang="cs-CZ" dirty="0" err="1"/>
+              <a:t>training</a:t>
             </a:r>
             <a:endParaRPr lang="cs-CZ" dirty="0"/>
           </a:p>
           <a:p>
-            <a:r>
-              <a:rPr lang="cs-CZ" dirty="0"/>
-              <a:t>C++</a:t>
-            </a:r>
-          </a:p>
-          <a:p>
-            <a:pPr lvl="1"/>
-            <a:r>
-              <a:rPr lang="cs-CZ" dirty="0" err="1"/>
-              <a:t>TensorFlow</a:t>
-            </a:r>
-            <a:endParaRPr lang="cs-CZ" dirty="0"/>
-          </a:p>
-          <a:p>
-            <a:pPr lvl="1"/>
-            <a:r>
-              <a:rPr lang="cs-CZ" dirty="0" err="1"/>
-              <a:t>Caffe</a:t>
-            </a:r>
-            <a:endParaRPr lang="cs-CZ" dirty="0"/>
-          </a:p>
-          <a:p>
-            <a:pPr lvl="1"/>
-            <a:r>
-              <a:rPr lang="cs-CZ" dirty="0" err="1"/>
-              <a:t>MLPack</a:t>
-            </a:r>
-            <a:endParaRPr lang="cs-CZ" dirty="0"/>
-          </a:p>
-          <a:p>
-            <a:r>
-              <a:rPr lang="cs-CZ" dirty="0"/>
-              <a:t>Java</a:t>
-            </a:r>
-          </a:p>
-          <a:p>
-            <a:pPr lvl="1"/>
-            <a:r>
-              <a:rPr lang="cs-CZ" dirty="0"/>
-              <a:t>DL4J</a:t>
-            </a:r>
-          </a:p>
-          <a:p>
-            <a:endParaRPr lang="cs-CZ" dirty="0"/>
-          </a:p>
-          <a:p>
-            <a:pPr lvl="1"/>
+            <a:pPr marL="514350" indent="-514350">
+              <a:buFont typeface="+mj-lt"/>
+              <a:buAutoNum type="arabicPeriod"/>
+            </a:pPr>
             <a:endParaRPr lang="cs-CZ" dirty="0"/>
           </a:p>
           <a:p>
@@ -8009,7 +8042,7 @@
     </p:spTree>
     <p:extLst>
       <p:ext uri="{BB962C8B-B14F-4D97-AF65-F5344CB8AC3E}">
-        <p14:creationId xmlns:p14="http://schemas.microsoft.com/office/powerpoint/2010/main" val="3451252834"/>
+        <p14:creationId xmlns:p14="http://schemas.microsoft.com/office/powerpoint/2010/main" val="283369796"/>
       </p:ext>
     </p:extLst>
   </p:cSld>
@@ -8041,6 +8074,363 @@
           <p:cNvPr id="2" name="Title 1">
             <a:extLst>
               <a:ext uri="{FF2B5EF4-FFF2-40B4-BE49-F238E27FC236}">
+                <a16:creationId xmlns:a16="http://schemas.microsoft.com/office/drawing/2014/main" id="{729859E7-1062-2C4A-8536-255793F51658}"/>
+              </a:ext>
+            </a:extLst>
+          </p:cNvPr>
+          <p:cNvSpPr>
+            <a:spLocks noGrp="1"/>
+          </p:cNvSpPr>
+          <p:nvPr>
+            <p:ph type="title"/>
+          </p:nvPr>
+        </p:nvSpPr>
+        <p:spPr/>
+        <p:txBody>
+          <a:bodyPr/>
+          <a:lstStyle/>
+          <a:p>
+            <a:r>
+              <a:rPr lang="cs-CZ" dirty="0"/>
+              <a:t>AI &amp; </a:t>
+            </a:r>
+            <a:r>
+              <a:rPr lang="cs-CZ" dirty="0" err="1"/>
+              <a:t>banking</a:t>
+            </a:r>
+            <a:endParaRPr lang="cs-CZ" dirty="0"/>
+          </a:p>
+        </p:txBody>
+      </p:sp>
+      <p:sp>
+        <p:nvSpPr>
+          <p:cNvPr id="3" name="Content Placeholder 2">
+            <a:extLst>
+              <a:ext uri="{FF2B5EF4-FFF2-40B4-BE49-F238E27FC236}">
+                <a16:creationId xmlns:a16="http://schemas.microsoft.com/office/drawing/2014/main" id="{945FEAC9-989A-CC47-A49C-7D7031A8D2C9}"/>
+              </a:ext>
+            </a:extLst>
+          </p:cNvPr>
+          <p:cNvSpPr>
+            <a:spLocks noGrp="1"/>
+          </p:cNvSpPr>
+          <p:nvPr>
+            <p:ph idx="1"/>
+          </p:nvPr>
+        </p:nvSpPr>
+        <p:spPr/>
+        <p:txBody>
+          <a:bodyPr/>
+          <a:lstStyle/>
+          <a:p>
+            <a:pPr>
+              <a:lnSpc>
+                <a:spcPct val="150000"/>
+              </a:lnSpc>
+            </a:pPr>
+            <a:r>
+              <a:rPr lang="cs-CZ" dirty="0"/>
+              <a:t>PFM</a:t>
+            </a:r>
+          </a:p>
+          <a:p>
+            <a:pPr>
+              <a:lnSpc>
+                <a:spcPct val="150000"/>
+              </a:lnSpc>
+            </a:pPr>
+            <a:r>
+              <a:rPr lang="cs-CZ" dirty="0" err="1"/>
+              <a:t>Fraud</a:t>
+            </a:r>
+            <a:r>
+              <a:rPr lang="cs-CZ" dirty="0"/>
+              <a:t> </a:t>
+            </a:r>
+            <a:r>
+              <a:rPr lang="cs-CZ" dirty="0" err="1"/>
+              <a:t>protection</a:t>
+            </a:r>
+            <a:endParaRPr lang="cs-CZ" dirty="0"/>
+          </a:p>
+          <a:p>
+            <a:pPr>
+              <a:lnSpc>
+                <a:spcPct val="150000"/>
+              </a:lnSpc>
+            </a:pPr>
+            <a:r>
+              <a:rPr lang="cs-CZ" dirty="0" err="1"/>
+              <a:t>Security</a:t>
+            </a:r>
+            <a:r>
+              <a:rPr lang="cs-CZ" dirty="0"/>
+              <a:t> </a:t>
+            </a:r>
+            <a:r>
+              <a:rPr lang="cs-CZ" dirty="0" err="1"/>
+              <a:t>login</a:t>
+            </a:r>
+            <a:r>
+              <a:rPr lang="cs-CZ" dirty="0"/>
+              <a:t> – </a:t>
+            </a:r>
+            <a:r>
+              <a:rPr lang="cs-CZ" dirty="0" err="1"/>
+              <a:t>Fingerprint</a:t>
+            </a:r>
+            <a:r>
+              <a:rPr lang="cs-CZ" dirty="0"/>
+              <a:t>, Face ID …</a:t>
+            </a:r>
+          </a:p>
+          <a:p>
+            <a:pPr>
+              <a:lnSpc>
+                <a:spcPct val="150000"/>
+              </a:lnSpc>
+            </a:pPr>
+            <a:r>
+              <a:rPr lang="cs-CZ" dirty="0" err="1"/>
+              <a:t>Customer</a:t>
+            </a:r>
+            <a:r>
+              <a:rPr lang="cs-CZ" dirty="0"/>
+              <a:t> </a:t>
+            </a:r>
+            <a:r>
+              <a:rPr lang="cs-CZ" dirty="0" err="1"/>
+              <a:t>service</a:t>
+            </a:r>
+            <a:r>
+              <a:rPr lang="cs-CZ" dirty="0"/>
+              <a:t> </a:t>
+            </a:r>
+            <a:r>
+              <a:rPr lang="cs-CZ" dirty="0" err="1"/>
+              <a:t>automation</a:t>
+            </a:r>
+            <a:endParaRPr lang="cs-CZ" dirty="0"/>
+          </a:p>
+          <a:p>
+            <a:pPr>
+              <a:lnSpc>
+                <a:spcPct val="150000"/>
+              </a:lnSpc>
+            </a:pPr>
+            <a:r>
+              <a:rPr lang="cs-CZ" dirty="0"/>
+              <a:t>Chat bot</a:t>
+            </a:r>
+          </a:p>
+          <a:p>
+            <a:endParaRPr lang="cs-CZ" dirty="0"/>
+          </a:p>
+          <a:p>
+            <a:endParaRPr lang="cs-CZ" dirty="0"/>
+          </a:p>
+        </p:txBody>
+      </p:sp>
+    </p:spTree>
+    <p:extLst>
+      <p:ext uri="{BB962C8B-B14F-4D97-AF65-F5344CB8AC3E}">
+        <p14:creationId xmlns:p14="http://schemas.microsoft.com/office/powerpoint/2010/main" val="716809081"/>
+      </p:ext>
+    </p:extLst>
+  </p:cSld>
+  <p:clrMapOvr>
+    <a:masterClrMapping/>
+  </p:clrMapOvr>
+</p:sld>
+</file>
+
+<file path=ppt/slides/slide17.xml><?xml version="1.0" encoding="utf-8"?>
+<p:sld xmlns:a="http://schemas.openxmlformats.org/drawingml/2006/main" xmlns:r="http://schemas.openxmlformats.org/officeDocument/2006/relationships" xmlns:p="http://schemas.openxmlformats.org/presentationml/2006/main">
+  <p:cSld>
+    <p:spTree>
+      <p:nvGrpSpPr>
+        <p:cNvPr id="1" name=""/>
+        <p:cNvGrpSpPr/>
+        <p:nvPr/>
+      </p:nvGrpSpPr>
+      <p:grpSpPr>
+        <a:xfrm>
+          <a:off x="0" y="0"/>
+          <a:ext cx="0" cy="0"/>
+          <a:chOff x="0" y="0"/>
+          <a:chExt cx="0" cy="0"/>
+        </a:xfrm>
+      </p:grpSpPr>
+      <p:sp>
+        <p:nvSpPr>
+          <p:cNvPr id="2" name="Title 1">
+            <a:extLst>
+              <a:ext uri="{FF2B5EF4-FFF2-40B4-BE49-F238E27FC236}">
+                <a16:creationId xmlns:a16="http://schemas.microsoft.com/office/drawing/2014/main" id="{B29E5387-3D7D-CA46-ABFB-AC087AFF044D}"/>
+              </a:ext>
+            </a:extLst>
+          </p:cNvPr>
+          <p:cNvSpPr>
+            <a:spLocks noGrp="1"/>
+          </p:cNvSpPr>
+          <p:nvPr>
+            <p:ph type="title"/>
+          </p:nvPr>
+        </p:nvSpPr>
+        <p:spPr/>
+        <p:txBody>
+          <a:bodyPr/>
+          <a:lstStyle/>
+          <a:p>
+            <a:r>
+              <a:rPr lang="cs-CZ" dirty="0"/>
+              <a:t>AI and Java</a:t>
+            </a:r>
+          </a:p>
+        </p:txBody>
+      </p:sp>
+      <p:sp>
+        <p:nvSpPr>
+          <p:cNvPr id="3" name="Content Placeholder 2">
+            <a:extLst>
+              <a:ext uri="{FF2B5EF4-FFF2-40B4-BE49-F238E27FC236}">
+                <a16:creationId xmlns:a16="http://schemas.microsoft.com/office/drawing/2014/main" id="{D3B6E749-500C-5D44-B09E-3B89D2138E86}"/>
+              </a:ext>
+            </a:extLst>
+          </p:cNvPr>
+          <p:cNvSpPr>
+            <a:spLocks noGrp="1"/>
+          </p:cNvSpPr>
+          <p:nvPr>
+            <p:ph idx="1"/>
+          </p:nvPr>
+        </p:nvSpPr>
+        <p:spPr/>
+        <p:txBody>
+          <a:bodyPr>
+            <a:normAutofit/>
+          </a:bodyPr>
+          <a:lstStyle/>
+          <a:p>
+            <a:r>
+              <a:rPr lang="cs-CZ" dirty="0"/>
+              <a:t>Python</a:t>
+            </a:r>
+          </a:p>
+          <a:p>
+            <a:pPr lvl="1"/>
+            <a:r>
+              <a:rPr lang="cs-CZ" dirty="0" err="1"/>
+              <a:t>TensorFlow</a:t>
+            </a:r>
+            <a:endParaRPr lang="cs-CZ" dirty="0"/>
+          </a:p>
+          <a:p>
+            <a:pPr lvl="1"/>
+            <a:r>
+              <a:rPr lang="cs-CZ" dirty="0" err="1"/>
+              <a:t>Theano</a:t>
+            </a:r>
+            <a:endParaRPr lang="cs-CZ" dirty="0"/>
+          </a:p>
+          <a:p>
+            <a:pPr lvl="1"/>
+            <a:r>
+              <a:rPr lang="cs-CZ" dirty="0" err="1"/>
+              <a:t>Keras</a:t>
+            </a:r>
+            <a:endParaRPr lang="cs-CZ" dirty="0"/>
+          </a:p>
+          <a:p>
+            <a:r>
+              <a:rPr lang="cs-CZ" dirty="0"/>
+              <a:t>C++</a:t>
+            </a:r>
+          </a:p>
+          <a:p>
+            <a:pPr lvl="1"/>
+            <a:r>
+              <a:rPr lang="cs-CZ" dirty="0" err="1"/>
+              <a:t>TensorFlow</a:t>
+            </a:r>
+            <a:endParaRPr lang="cs-CZ" dirty="0"/>
+          </a:p>
+          <a:p>
+            <a:pPr lvl="1"/>
+            <a:r>
+              <a:rPr lang="cs-CZ" dirty="0" err="1"/>
+              <a:t>Caffe</a:t>
+            </a:r>
+            <a:endParaRPr lang="cs-CZ" dirty="0"/>
+          </a:p>
+          <a:p>
+            <a:pPr lvl="1"/>
+            <a:r>
+              <a:rPr lang="cs-CZ" dirty="0" err="1"/>
+              <a:t>MLPack</a:t>
+            </a:r>
+            <a:endParaRPr lang="cs-CZ" dirty="0"/>
+          </a:p>
+          <a:p>
+            <a:r>
+              <a:rPr lang="cs-CZ" dirty="0"/>
+              <a:t>Java</a:t>
+            </a:r>
+          </a:p>
+          <a:p>
+            <a:pPr lvl="1"/>
+            <a:r>
+              <a:rPr lang="cs-CZ" dirty="0"/>
+              <a:t>DL4J</a:t>
+            </a:r>
+          </a:p>
+          <a:p>
+            <a:endParaRPr lang="cs-CZ" dirty="0"/>
+          </a:p>
+          <a:p>
+            <a:pPr lvl="1"/>
+            <a:endParaRPr lang="cs-CZ" dirty="0"/>
+          </a:p>
+          <a:p>
+            <a:endParaRPr lang="cs-CZ" dirty="0"/>
+          </a:p>
+        </p:txBody>
+      </p:sp>
+    </p:spTree>
+    <p:extLst>
+      <p:ext uri="{BB962C8B-B14F-4D97-AF65-F5344CB8AC3E}">
+        <p14:creationId xmlns:p14="http://schemas.microsoft.com/office/powerpoint/2010/main" val="3451252834"/>
+      </p:ext>
+    </p:extLst>
+  </p:cSld>
+  <p:clrMapOvr>
+    <a:masterClrMapping/>
+  </p:clrMapOvr>
+</p:sld>
+</file>
+
+<file path=ppt/slides/slide18.xml><?xml version="1.0" encoding="utf-8"?>
+<p:sld xmlns:a="http://schemas.openxmlformats.org/drawingml/2006/main" xmlns:r="http://schemas.openxmlformats.org/officeDocument/2006/relationships" xmlns:p="http://schemas.openxmlformats.org/presentationml/2006/main">
+  <p:cSld>
+    <p:spTree>
+      <p:nvGrpSpPr>
+        <p:cNvPr id="1" name=""/>
+        <p:cNvGrpSpPr/>
+        <p:nvPr/>
+      </p:nvGrpSpPr>
+      <p:grpSpPr>
+        <a:xfrm>
+          <a:off x="0" y="0"/>
+          <a:ext cx="0" cy="0"/>
+          <a:chOff x="0" y="0"/>
+          <a:chExt cx="0" cy="0"/>
+        </a:xfrm>
+      </p:grpSpPr>
+      <p:sp>
+        <p:nvSpPr>
+          <p:cNvPr id="2" name="Title 1">
+            <a:extLst>
+              <a:ext uri="{FF2B5EF4-FFF2-40B4-BE49-F238E27FC236}">
                 <a16:creationId xmlns:a16="http://schemas.microsoft.com/office/drawing/2014/main" id="{40B9091D-F73E-1C47-BFEC-5C63E673251C}"/>
               </a:ext>
             </a:extLst>
@@ -8179,7 +8569,7 @@
 </p:sld>
 </file>
 
-<file path=ppt/slides/slide17.xml><?xml version="1.0" encoding="utf-8"?>
+<file path=ppt/slides/slide19.xml><?xml version="1.0" encoding="utf-8"?>
 <p:sld xmlns:a="http://schemas.openxmlformats.org/drawingml/2006/main" xmlns:r="http://schemas.openxmlformats.org/officeDocument/2006/relationships" xmlns:p="http://schemas.openxmlformats.org/presentationml/2006/main">
   <p:cSld>
     <p:spTree>
@@ -8309,6 +8699,503 @@
           <p:cNvPr id="2" name="Title 1">
             <a:extLst>
               <a:ext uri="{FF2B5EF4-FFF2-40B4-BE49-F238E27FC236}">
+                <a16:creationId xmlns:a16="http://schemas.microsoft.com/office/drawing/2014/main" id="{08E10057-59B0-B046-B34A-0EBB349BB13E}"/>
+              </a:ext>
+            </a:extLst>
+          </p:cNvPr>
+          <p:cNvSpPr>
+            <a:spLocks noGrp="1"/>
+          </p:cNvSpPr>
+          <p:nvPr>
+            <p:ph type="title"/>
+          </p:nvPr>
+        </p:nvSpPr>
+        <p:spPr/>
+        <p:txBody>
+          <a:bodyPr/>
+          <a:lstStyle/>
+          <a:p>
+            <a:r>
+              <a:rPr lang="cs-CZ" dirty="0" err="1"/>
+              <a:t>Antonin</a:t>
+            </a:r>
+            <a:r>
+              <a:rPr lang="cs-CZ" dirty="0"/>
+              <a:t> </a:t>
+            </a:r>
+            <a:r>
+              <a:rPr lang="cs-CZ" dirty="0" err="1"/>
+              <a:t>Stoklasek</a:t>
+            </a:r>
+            <a:endParaRPr lang="cs-CZ" dirty="0"/>
+          </a:p>
+        </p:txBody>
+      </p:sp>
+      <p:sp>
+        <p:nvSpPr>
+          <p:cNvPr id="3" name="Content Placeholder 2">
+            <a:extLst>
+              <a:ext uri="{FF2B5EF4-FFF2-40B4-BE49-F238E27FC236}">
+                <a16:creationId xmlns:a16="http://schemas.microsoft.com/office/drawing/2014/main" id="{5C4C3172-EF50-2347-B557-31F0A952D9FE}"/>
+              </a:ext>
+            </a:extLst>
+          </p:cNvPr>
+          <p:cNvSpPr>
+            <a:spLocks noGrp="1"/>
+          </p:cNvSpPr>
+          <p:nvPr>
+            <p:ph idx="1"/>
+          </p:nvPr>
+        </p:nvSpPr>
+        <p:spPr>
+          <a:xfrm>
+            <a:off x="838199" y="1649691"/>
+            <a:ext cx="6099495" cy="4527272"/>
+          </a:xfrm>
+        </p:spPr>
+        <p:txBody>
+          <a:bodyPr/>
+          <a:lstStyle/>
+          <a:p>
+            <a:r>
+              <a:rPr lang="en-US" dirty="0"/>
+              <a:t>Technical Team Leader</a:t>
+            </a:r>
+          </a:p>
+          <a:p>
+            <a:r>
+              <a:rPr lang="en-US" dirty="0"/>
+              <a:t>Programmer 10+ years</a:t>
+            </a:r>
+          </a:p>
+          <a:p>
+            <a:r>
+              <a:rPr lang="en-US" b="1" dirty="0"/>
+              <a:t>Banking Software Company</a:t>
+            </a:r>
+            <a:r>
+              <a:rPr lang="en-US" dirty="0"/>
+              <a:t>, </a:t>
+            </a:r>
+            <a:r>
+              <a:rPr lang="en-US" dirty="0" err="1"/>
+              <a:t>pobočka</a:t>
+            </a:r>
+            <a:r>
+              <a:rPr lang="en-US" dirty="0"/>
+              <a:t> </a:t>
+            </a:r>
+            <a:r>
+              <a:rPr lang="en-US" b="1" dirty="0"/>
+              <a:t>Olomouc</a:t>
+            </a:r>
+          </a:p>
+          <a:p>
+            <a:r>
+              <a:rPr lang="en-US" dirty="0"/>
+              <a:t>Java, Docker, React, …</a:t>
+            </a:r>
+          </a:p>
+          <a:p>
+            <a:r>
+              <a:rPr lang="en-US" dirty="0"/>
+              <a:t>Twitter @tonda100</a:t>
+            </a:r>
+          </a:p>
+          <a:p>
+            <a:r>
+              <a:rPr lang="en-US" dirty="0"/>
+              <a:t>GitHub tonda100</a:t>
+            </a:r>
+          </a:p>
+          <a:p>
+            <a:endParaRPr lang="cs-CZ" dirty="0"/>
+          </a:p>
+        </p:txBody>
+      </p:sp>
+      <p:pic>
+        <p:nvPicPr>
+          <p:cNvPr id="4" name="Picture 3">
+            <a:extLst>
+              <a:ext uri="{FF2B5EF4-FFF2-40B4-BE49-F238E27FC236}">
+                <a16:creationId xmlns:a16="http://schemas.microsoft.com/office/drawing/2014/main" id="{392C19DE-C76C-7745-82C6-B9A992343E61}"/>
+              </a:ext>
+            </a:extLst>
+          </p:cNvPr>
+          <p:cNvPicPr>
+            <a:picLocks noChangeAspect="1"/>
+          </p:cNvPicPr>
+          <p:nvPr/>
+        </p:nvPicPr>
+        <p:blipFill>
+          <a:blip r:embed="rId2">
+            <a:extLst>
+              <a:ext uri="{28A0092B-C50C-407E-A947-70E740481C1C}">
+                <a14:useLocalDpi xmlns:a14="http://schemas.microsoft.com/office/drawing/2010/main" val="0"/>
+              </a:ext>
+            </a:extLst>
+          </a:blip>
+          <a:stretch>
+            <a:fillRect/>
+          </a:stretch>
+        </p:blipFill>
+        <p:spPr>
+          <a:xfrm>
+            <a:off x="7153871" y="1649691"/>
+            <a:ext cx="3623349" cy="3623349"/>
+          </a:xfrm>
+          <a:prstGeom prst="rect">
+            <a:avLst/>
+          </a:prstGeom>
+        </p:spPr>
+      </p:pic>
+    </p:spTree>
+    <p:extLst>
+      <p:ext uri="{BB962C8B-B14F-4D97-AF65-F5344CB8AC3E}">
+        <p14:creationId xmlns:p14="http://schemas.microsoft.com/office/powerpoint/2010/main" val="2521143711"/>
+      </p:ext>
+    </p:extLst>
+  </p:cSld>
+  <p:clrMapOvr>
+    <a:masterClrMapping/>
+  </p:clrMapOvr>
+</p:sld>
+</file>
+
+<file path=ppt/slides/slide3.xml><?xml version="1.0" encoding="utf-8"?>
+<p:sld xmlns:a="http://schemas.openxmlformats.org/drawingml/2006/main" xmlns:r="http://schemas.openxmlformats.org/officeDocument/2006/relationships" xmlns:p="http://schemas.openxmlformats.org/presentationml/2006/main">
+  <p:cSld>
+    <p:bg>
+      <p:bgPr>
+        <a:solidFill>
+          <a:schemeClr val="bg1"/>
+        </a:solidFill>
+        <a:effectLst/>
+      </p:bgPr>
+    </p:bg>
+    <p:spTree>
+      <p:nvGrpSpPr>
+        <p:cNvPr id="1" name=""/>
+        <p:cNvGrpSpPr/>
+        <p:nvPr/>
+      </p:nvGrpSpPr>
+      <p:grpSpPr>
+        <a:xfrm>
+          <a:off x="0" y="0"/>
+          <a:ext cx="0" cy="0"/>
+          <a:chOff x="0" y="0"/>
+          <a:chExt cx="0" cy="0"/>
+        </a:xfrm>
+      </p:grpSpPr>
+      <p:sp>
+        <p:nvSpPr>
+          <p:cNvPr id="2" name="Title 1">
+            <a:extLst>
+              <a:ext uri="{FF2B5EF4-FFF2-40B4-BE49-F238E27FC236}">
+                <a16:creationId xmlns:a16="http://schemas.microsoft.com/office/drawing/2014/main" id="{C2FE8879-CF3D-B24B-BEA7-F2EA328F2EEB}"/>
+              </a:ext>
+            </a:extLst>
+          </p:cNvPr>
+          <p:cNvSpPr>
+            <a:spLocks noGrp="1"/>
+          </p:cNvSpPr>
+          <p:nvPr>
+            <p:ph type="title"/>
+          </p:nvPr>
+        </p:nvSpPr>
+        <p:spPr>
+          <a:xfrm>
+            <a:off x="655320" y="365125"/>
+            <a:ext cx="5120114" cy="1692794"/>
+          </a:xfrm>
+        </p:spPr>
+        <p:txBody>
+          <a:bodyPr>
+            <a:normAutofit/>
+          </a:bodyPr>
+          <a:lstStyle/>
+          <a:p>
+            <a:r>
+              <a:rPr lang="cs-CZ" dirty="0" err="1"/>
+              <a:t>Banking</a:t>
+            </a:r>
+            <a:r>
+              <a:rPr lang="cs-CZ" dirty="0"/>
+              <a:t> Software </a:t>
+            </a:r>
+            <a:r>
+              <a:rPr lang="cs-CZ" dirty="0" err="1"/>
+              <a:t>Company</a:t>
+            </a:r>
+            <a:endParaRPr lang="cs-CZ" dirty="0"/>
+          </a:p>
+        </p:txBody>
+      </p:sp>
+      <p:cxnSp>
+        <p:nvCxnSpPr>
+          <p:cNvPr id="10" name="Straight Arrow Connector 9">
+            <a:extLst>
+              <a:ext uri="{FF2B5EF4-FFF2-40B4-BE49-F238E27FC236}">
+                <a16:creationId xmlns:a16="http://schemas.microsoft.com/office/drawing/2014/main" id="{E4A809D5-3600-46D4-A466-67F2349A54FB}"/>
+              </a:ext>
+              <a:ext uri="{C183D7F6-B498-43B3-948B-1728B52AA6E4}">
+                <adec:decorative xmlns:adec="http://schemas.microsoft.com/office/drawing/2017/decorative" val="1"/>
+              </a:ext>
+            </a:extLst>
+          </p:cNvPr>
+          <p:cNvCxnSpPr>
+            <a:cxnSpLocks noGrp="1" noRot="1" noChangeAspect="1" noMove="1" noResize="1" noEditPoints="1" noAdjustHandles="1" noChangeArrowheads="1" noChangeShapeType="1"/>
+          </p:cNvCxnSpPr>
+          <p:nvPr>
+            <p:extLst>
+              <p:ext uri="{386F3935-93C4-4BCD-93E2-E3B085C9AB24}">
+                <p16:designElem xmlns:p16="http://schemas.microsoft.com/office/powerpoint/2015/main" val="1"/>
+              </p:ext>
+            </p:extLst>
+          </p:nvPr>
+        </p:nvCxnSpPr>
+        <p:spPr>
+          <a:xfrm>
+            <a:off x="655320" y="2316480"/>
+            <a:ext cx="4572000" cy="0"/>
+          </a:xfrm>
+          <a:prstGeom prst="straightConnector1">
+            <a:avLst/>
+          </a:prstGeom>
+          <a:ln w="19050" cap="sq">
+            <a:solidFill>
+              <a:schemeClr val="tx1"/>
+            </a:solidFill>
+            <a:tailEnd type="none"/>
+          </a:ln>
+        </p:spPr>
+        <p:style>
+          <a:lnRef idx="1">
+            <a:schemeClr val="accent1"/>
+          </a:lnRef>
+          <a:fillRef idx="0">
+            <a:schemeClr val="accent1"/>
+          </a:fillRef>
+          <a:effectRef idx="0">
+            <a:schemeClr val="accent1"/>
+          </a:effectRef>
+          <a:fontRef idx="minor">
+            <a:schemeClr val="tx1"/>
+          </a:fontRef>
+        </p:style>
+      </p:cxnSp>
+      <p:sp>
+        <p:nvSpPr>
+          <p:cNvPr id="3" name="Content Placeholder 2">
+            <a:extLst>
+              <a:ext uri="{FF2B5EF4-FFF2-40B4-BE49-F238E27FC236}">
+                <a16:creationId xmlns:a16="http://schemas.microsoft.com/office/drawing/2014/main" id="{0328397A-F8C0-274E-A950-A56A272F6D5D}"/>
+              </a:ext>
+            </a:extLst>
+          </p:cNvPr>
+          <p:cNvSpPr>
+            <a:spLocks noGrp="1"/>
+          </p:cNvSpPr>
+          <p:nvPr>
+            <p:ph idx="1"/>
+          </p:nvPr>
+        </p:nvSpPr>
+        <p:spPr>
+          <a:xfrm>
+            <a:off x="655321" y="2575034"/>
+            <a:ext cx="5120113" cy="3462228"/>
+          </a:xfrm>
+        </p:spPr>
+        <p:txBody>
+          <a:bodyPr>
+            <a:normAutofit/>
+          </a:bodyPr>
+          <a:lstStyle/>
+          <a:p>
+            <a:r>
+              <a:rPr lang="en" sz="1800" dirty="0"/>
+              <a:t>Since 1990</a:t>
+            </a:r>
+          </a:p>
+          <a:p>
+            <a:r>
+              <a:rPr lang="en" sz="1800" dirty="0"/>
+              <a:t>IT for financial institutions</a:t>
+            </a:r>
+          </a:p>
+          <a:p>
+            <a:r>
+              <a:rPr lang="en" sz="1800" dirty="0"/>
+              <a:t>7 millions clients</a:t>
+            </a:r>
+          </a:p>
+          <a:p>
+            <a:r>
+              <a:rPr lang="en" sz="1800" dirty="0"/>
+              <a:t>17 countries</a:t>
+            </a:r>
+          </a:p>
+          <a:p>
+            <a:r>
+              <a:rPr lang="en" sz="1800" dirty="0"/>
+              <a:t>8 branches (PRG, OLO, PRS, …)</a:t>
+            </a:r>
+          </a:p>
+          <a:p>
+            <a:r>
+              <a:rPr lang="cs-CZ" sz="1800" dirty="0">
+                <a:hlinkClick r:id="rId2"/>
+              </a:rPr>
+              <a:t>https://www.bankingsoftware.company</a:t>
+            </a:r>
+            <a:endParaRPr lang="en" sz="1800" dirty="0"/>
+          </a:p>
+          <a:p>
+            <a:endParaRPr lang="cs-CZ" sz="1800" dirty="0"/>
+          </a:p>
+        </p:txBody>
+      </p:sp>
+      <p:pic>
+        <p:nvPicPr>
+          <p:cNvPr id="5" name="Picture 4">
+            <a:extLst>
+              <a:ext uri="{FF2B5EF4-FFF2-40B4-BE49-F238E27FC236}">
+                <a16:creationId xmlns:a16="http://schemas.microsoft.com/office/drawing/2014/main" id="{B2960E67-E819-D448-8785-3784810D31FB}"/>
+              </a:ext>
+            </a:extLst>
+          </p:cNvPr>
+          <p:cNvPicPr>
+            <a:picLocks noChangeAspect="1"/>
+          </p:cNvPicPr>
+          <p:nvPr/>
+        </p:nvPicPr>
+        <p:blipFill rotWithShape="1">
+          <a:blip r:embed="rId3">
+            <a:extLst>
+              <a:ext uri="{28A0092B-C50C-407E-A947-70E740481C1C}">
+                <a14:useLocalDpi xmlns:a14="http://schemas.microsoft.com/office/drawing/2010/main" val="0"/>
+              </a:ext>
+            </a:extLst>
+          </a:blip>
+          <a:srcRect l="26623" r="11929" b="-1"/>
+          <a:stretch/>
+        </p:blipFill>
+        <p:spPr>
+          <a:xfrm>
+            <a:off x="5878849" y="10"/>
+            <a:ext cx="6313150" cy="6857987"/>
+          </a:xfrm>
+          <a:custGeom>
+            <a:avLst/>
+            <a:gdLst>
+              <a:gd name="connsiteX0" fmla="*/ 65565 w 6313150"/>
+              <a:gd name="connsiteY0" fmla="*/ 0 h 6857997"/>
+              <a:gd name="connsiteX1" fmla="*/ 6313150 w 6313150"/>
+              <a:gd name="connsiteY1" fmla="*/ 0 h 6857997"/>
+              <a:gd name="connsiteX2" fmla="*/ 6313150 w 6313150"/>
+              <a:gd name="connsiteY2" fmla="*/ 6857997 h 6857997"/>
+              <a:gd name="connsiteX3" fmla="*/ 3293946 w 6313150"/>
+              <a:gd name="connsiteY3" fmla="*/ 6857997 h 6857997"/>
+              <a:gd name="connsiteX4" fmla="*/ 3235857 w 6313150"/>
+              <a:gd name="connsiteY4" fmla="*/ 6823061 h 6857997"/>
+              <a:gd name="connsiteX5" fmla="*/ 0 w 6313150"/>
+              <a:gd name="connsiteY5" fmla="*/ 951803 h 6857997"/>
+              <a:gd name="connsiteX6" fmla="*/ 31536 w 6313150"/>
+              <a:gd name="connsiteY6" fmla="*/ 285771 h 6857997"/>
+            </a:gdLst>
+            <a:ahLst/>
+            <a:cxnLst>
+              <a:cxn ang="0">
+                <a:pos x="connsiteX0" y="connsiteY0"/>
+              </a:cxn>
+              <a:cxn ang="0">
+                <a:pos x="connsiteX1" y="connsiteY1"/>
+              </a:cxn>
+              <a:cxn ang="0">
+                <a:pos x="connsiteX2" y="connsiteY2"/>
+              </a:cxn>
+              <a:cxn ang="0">
+                <a:pos x="connsiteX3" y="connsiteY3"/>
+              </a:cxn>
+              <a:cxn ang="0">
+                <a:pos x="connsiteX4" y="connsiteY4"/>
+              </a:cxn>
+              <a:cxn ang="0">
+                <a:pos x="connsiteX5" y="connsiteY5"/>
+              </a:cxn>
+              <a:cxn ang="0">
+                <a:pos x="connsiteX6" y="connsiteY6"/>
+              </a:cxn>
+            </a:cxnLst>
+            <a:rect l="l" t="t" r="r" b="b"/>
+            <a:pathLst>
+              <a:path w="6313150" h="6857997">
+                <a:moveTo>
+                  <a:pt x="65565" y="0"/>
+                </a:moveTo>
+                <a:lnTo>
+                  <a:pt x="6313150" y="0"/>
+                </a:lnTo>
+                <a:lnTo>
+                  <a:pt x="6313150" y="6857997"/>
+                </a:lnTo>
+                <a:lnTo>
+                  <a:pt x="3293946" y="6857997"/>
+                </a:lnTo>
+                <a:lnTo>
+                  <a:pt x="3235857" y="6823061"/>
+                </a:lnTo>
+                <a:cubicBezTo>
+                  <a:pt x="1291240" y="5592803"/>
+                  <a:pt x="0" y="3423096"/>
+                  <a:pt x="0" y="951803"/>
+                </a:cubicBezTo>
+                <a:cubicBezTo>
+                  <a:pt x="0" y="727140"/>
+                  <a:pt x="10673" y="504970"/>
+                  <a:pt x="31536" y="285771"/>
+                </a:cubicBezTo>
+                <a:close/>
+              </a:path>
+            </a:pathLst>
+          </a:custGeom>
+        </p:spPr>
+      </p:pic>
+    </p:spTree>
+    <p:extLst>
+      <p:ext uri="{BB962C8B-B14F-4D97-AF65-F5344CB8AC3E}">
+        <p14:creationId xmlns:p14="http://schemas.microsoft.com/office/powerpoint/2010/main" val="2276704248"/>
+      </p:ext>
+    </p:extLst>
+  </p:cSld>
+  <p:clrMapOvr>
+    <a:masterClrMapping/>
+  </p:clrMapOvr>
+</p:sld>
+</file>
+
+<file path=ppt/slides/slide4.xml><?xml version="1.0" encoding="utf-8"?>
+<p:sld xmlns:a="http://schemas.openxmlformats.org/drawingml/2006/main" xmlns:r="http://schemas.openxmlformats.org/officeDocument/2006/relationships" xmlns:p="http://schemas.openxmlformats.org/presentationml/2006/main">
+  <p:cSld>
+    <p:spTree>
+      <p:nvGrpSpPr>
+        <p:cNvPr id="1" name=""/>
+        <p:cNvGrpSpPr/>
+        <p:nvPr/>
+      </p:nvGrpSpPr>
+      <p:grpSpPr>
+        <a:xfrm>
+          <a:off x="0" y="0"/>
+          <a:ext cx="0" cy="0"/>
+          <a:chOff x="0" y="0"/>
+          <a:chExt cx="0" cy="0"/>
+        </a:xfrm>
+      </p:grpSpPr>
+      <p:sp>
+        <p:nvSpPr>
+          <p:cNvPr id="2" name="Title 1">
+            <a:extLst>
+              <a:ext uri="{FF2B5EF4-FFF2-40B4-BE49-F238E27FC236}">
                 <a16:creationId xmlns:a16="http://schemas.microsoft.com/office/drawing/2014/main" id="{3AECEF6D-E2C4-1B4B-AA15-FE69B14F0CB7}"/>
               </a:ext>
             </a:extLst>
@@ -8434,7 +9321,7 @@
 </p:sld>
 </file>
 
-<file path=ppt/slides/slide3.xml><?xml version="1.0" encoding="utf-8"?>
+<file path=ppt/slides/slide5.xml><?xml version="1.0" encoding="utf-8"?>
 <p:sld xmlns:a="http://schemas.openxmlformats.org/drawingml/2006/main" xmlns:r="http://schemas.openxmlformats.org/officeDocument/2006/relationships" xmlns:p="http://schemas.openxmlformats.org/presentationml/2006/main">
   <p:cSld>
     <p:spTree>
@@ -8541,7 +9428,7 @@
 </p:sld>
 </file>
 
-<file path=ppt/slides/slide4.xml><?xml version="1.0" encoding="utf-8"?>
+<file path=ppt/slides/slide6.xml><?xml version="1.0" encoding="utf-8"?>
 <p:sld xmlns:a="http://schemas.openxmlformats.org/drawingml/2006/main" xmlns:r="http://schemas.openxmlformats.org/officeDocument/2006/relationships" xmlns:p="http://schemas.openxmlformats.org/presentationml/2006/main">
   <p:cSld>
     <p:spTree>
@@ -8760,7 +9647,7 @@
 </p:sld>
 </file>
 
-<file path=ppt/slides/slide5.xml><?xml version="1.0" encoding="utf-8"?>
+<file path=ppt/slides/slide7.xml><?xml version="1.0" encoding="utf-8"?>
 <p:sld xmlns:a="http://schemas.openxmlformats.org/drawingml/2006/main" xmlns:r="http://schemas.openxmlformats.org/officeDocument/2006/relationships" xmlns:p="http://schemas.openxmlformats.org/presentationml/2006/main">
   <p:cSld>
     <p:spTree>
@@ -8907,7 +9794,7 @@
 </p:sld>
 </file>
 
-<file path=ppt/slides/slide6.xml><?xml version="1.0" encoding="utf-8"?>
+<file path=ppt/slides/slide8.xml><?xml version="1.0" encoding="utf-8"?>
 <p:sld xmlns:a="http://schemas.openxmlformats.org/drawingml/2006/main" xmlns:r="http://schemas.openxmlformats.org/officeDocument/2006/relationships" xmlns:p="http://schemas.openxmlformats.org/presentationml/2006/main">
   <p:cSld>
     <p:spTree>
@@ -9405,428 +10292,6 @@
 </p:sld>
 </file>
 
-<file path=ppt/slides/slide7.xml><?xml version="1.0" encoding="utf-8"?>
-<p:sld xmlns:a="http://schemas.openxmlformats.org/drawingml/2006/main" xmlns:r="http://schemas.openxmlformats.org/officeDocument/2006/relationships" xmlns:p="http://schemas.openxmlformats.org/presentationml/2006/main">
-  <p:cSld>
-    <p:spTree>
-      <p:nvGrpSpPr>
-        <p:cNvPr id="1" name=""/>
-        <p:cNvGrpSpPr/>
-        <p:nvPr/>
-      </p:nvGrpSpPr>
-      <p:grpSpPr>
-        <a:xfrm>
-          <a:off x="0" y="0"/>
-          <a:ext cx="0" cy="0"/>
-          <a:chOff x="0" y="0"/>
-          <a:chExt cx="0" cy="0"/>
-        </a:xfrm>
-      </p:grpSpPr>
-      <p:sp>
-        <p:nvSpPr>
-          <p:cNvPr id="2" name="Title 1">
-            <a:extLst>
-              <a:ext uri="{FF2B5EF4-FFF2-40B4-BE49-F238E27FC236}">
-                <a16:creationId xmlns:a16="http://schemas.microsoft.com/office/drawing/2014/main" id="{ADD347FF-10DB-494D-BB8C-14E8C19C9CC0}"/>
-              </a:ext>
-            </a:extLst>
-          </p:cNvPr>
-          <p:cNvSpPr>
-            <a:spLocks noGrp="1"/>
-          </p:cNvSpPr>
-          <p:nvPr>
-            <p:ph type="title"/>
-          </p:nvPr>
-        </p:nvSpPr>
-        <p:spPr/>
-        <p:txBody>
-          <a:bodyPr/>
-          <a:lstStyle/>
-          <a:p>
-            <a:r>
-              <a:rPr lang="cs-CZ" dirty="0" err="1"/>
-              <a:t>Deep</a:t>
-            </a:r>
-            <a:r>
-              <a:rPr lang="cs-CZ" dirty="0"/>
-              <a:t> </a:t>
-            </a:r>
-            <a:r>
-              <a:rPr lang="cs-CZ" dirty="0" err="1"/>
-              <a:t>Learning</a:t>
-            </a:r>
-            <a:endParaRPr lang="cs-CZ" dirty="0"/>
-          </a:p>
-        </p:txBody>
-      </p:sp>
-      <p:sp>
-        <p:nvSpPr>
-          <p:cNvPr id="3" name="Content Placeholder 2">
-            <a:extLst>
-              <a:ext uri="{FF2B5EF4-FFF2-40B4-BE49-F238E27FC236}">
-                <a16:creationId xmlns:a16="http://schemas.microsoft.com/office/drawing/2014/main" id="{11F0B45D-59BC-5449-84F8-49116E8A2CAA}"/>
-              </a:ext>
-            </a:extLst>
-          </p:cNvPr>
-          <p:cNvSpPr>
-            <a:spLocks noGrp="1"/>
-          </p:cNvSpPr>
-          <p:nvPr>
-            <p:ph idx="1"/>
-          </p:nvPr>
-        </p:nvSpPr>
-        <p:spPr/>
-        <p:txBody>
-          <a:bodyPr>
-            <a:normAutofit fontScale="92500" lnSpcReduction="20000"/>
-          </a:bodyPr>
-          <a:lstStyle/>
-          <a:p>
-            <a:pPr>
-              <a:lnSpc>
-                <a:spcPct val="150000"/>
-              </a:lnSpc>
-            </a:pPr>
-            <a:r>
-              <a:rPr lang="en-US" dirty="0"/>
-              <a:t>Subset of ML</a:t>
-            </a:r>
-          </a:p>
-          <a:p>
-            <a:pPr>
-              <a:lnSpc>
-                <a:spcPct val="150000"/>
-              </a:lnSpc>
-            </a:pPr>
-            <a:r>
-              <a:rPr lang="en-US" dirty="0"/>
-              <a:t>Inspired by human brain</a:t>
-            </a:r>
-          </a:p>
-          <a:p>
-            <a:pPr>
-              <a:lnSpc>
-                <a:spcPct val="150000"/>
-              </a:lnSpc>
-            </a:pPr>
-            <a:r>
-              <a:rPr lang="en-US" dirty="0"/>
-              <a:t>Data – various categories</a:t>
-            </a:r>
-          </a:p>
-          <a:p>
-            <a:pPr>
-              <a:lnSpc>
-                <a:spcPct val="150000"/>
-              </a:lnSpc>
-            </a:pPr>
-            <a:r>
-              <a:rPr lang="en-US" dirty="0"/>
-              <a:t>Comparing to known items</a:t>
-            </a:r>
-          </a:p>
-          <a:p>
-            <a:pPr>
-              <a:lnSpc>
-                <a:spcPct val="150000"/>
-              </a:lnSpc>
-            </a:pPr>
-            <a:r>
-              <a:rPr lang="en-US" dirty="0"/>
-              <a:t>Neural Networks – brain like decision making</a:t>
-            </a:r>
-          </a:p>
-          <a:p>
-            <a:pPr>
-              <a:lnSpc>
-                <a:spcPct val="150000"/>
-              </a:lnSpc>
-            </a:pPr>
-            <a:r>
-              <a:rPr lang="en-US" dirty="0"/>
-              <a:t>Discovers features</a:t>
-            </a:r>
-          </a:p>
-          <a:p>
-            <a:pPr>
-              <a:lnSpc>
-                <a:spcPct val="150000"/>
-              </a:lnSpc>
-            </a:pPr>
-            <a:r>
-              <a:rPr lang="en-US" dirty="0"/>
-              <a:t>Big amount of training data </a:t>
-            </a:r>
-          </a:p>
-        </p:txBody>
-      </p:sp>
-    </p:spTree>
-    <p:extLst>
-      <p:ext uri="{BB962C8B-B14F-4D97-AF65-F5344CB8AC3E}">
-        <p14:creationId xmlns:p14="http://schemas.microsoft.com/office/powerpoint/2010/main" val="2864905902"/>
-      </p:ext>
-    </p:extLst>
-  </p:cSld>
-  <p:clrMapOvr>
-    <a:masterClrMapping/>
-  </p:clrMapOvr>
-</p:sld>
-</file>
-
-<file path=ppt/slides/slide8.xml><?xml version="1.0" encoding="utf-8"?>
-<p:sld xmlns:a="http://schemas.openxmlformats.org/drawingml/2006/main" xmlns:r="http://schemas.openxmlformats.org/officeDocument/2006/relationships" xmlns:p="http://schemas.openxmlformats.org/presentationml/2006/main">
-  <p:cSld>
-    <p:spTree>
-      <p:nvGrpSpPr>
-        <p:cNvPr id="1" name=""/>
-        <p:cNvGrpSpPr/>
-        <p:nvPr/>
-      </p:nvGrpSpPr>
-      <p:grpSpPr>
-        <a:xfrm>
-          <a:off x="0" y="0"/>
-          <a:ext cx="0" cy="0"/>
-          <a:chOff x="0" y="0"/>
-          <a:chExt cx="0" cy="0"/>
-        </a:xfrm>
-      </p:grpSpPr>
-      <p:sp>
-        <p:nvSpPr>
-          <p:cNvPr id="2" name="Title 1">
-            <a:extLst>
-              <a:ext uri="{FF2B5EF4-FFF2-40B4-BE49-F238E27FC236}">
-                <a16:creationId xmlns:a16="http://schemas.microsoft.com/office/drawing/2014/main" id="{8AD56874-F4D3-664F-9C2F-C2BCABC7D8F8}"/>
-              </a:ext>
-            </a:extLst>
-          </p:cNvPr>
-          <p:cNvSpPr>
-            <a:spLocks noGrp="1"/>
-          </p:cNvSpPr>
-          <p:nvPr>
-            <p:ph type="title"/>
-          </p:nvPr>
-        </p:nvSpPr>
-        <p:spPr/>
-        <p:txBody>
-          <a:bodyPr/>
-          <a:lstStyle/>
-          <a:p>
-            <a:r>
-              <a:rPr lang="cs-CZ" dirty="0" err="1"/>
-              <a:t>Neural</a:t>
-            </a:r>
-            <a:r>
-              <a:rPr lang="cs-CZ" dirty="0"/>
-              <a:t> Network</a:t>
-            </a:r>
-          </a:p>
-        </p:txBody>
-      </p:sp>
-      <p:sp>
-        <p:nvSpPr>
-          <p:cNvPr id="3" name="Content Placeholder 2">
-            <a:extLst>
-              <a:ext uri="{FF2B5EF4-FFF2-40B4-BE49-F238E27FC236}">
-                <a16:creationId xmlns:a16="http://schemas.microsoft.com/office/drawing/2014/main" id="{9C480C33-FD15-0146-AF0D-41C64A5624CD}"/>
-              </a:ext>
-            </a:extLst>
-          </p:cNvPr>
-          <p:cNvSpPr>
-            <a:spLocks noGrp="1"/>
-          </p:cNvSpPr>
-          <p:nvPr>
-            <p:ph idx="1"/>
-          </p:nvPr>
-        </p:nvSpPr>
-        <p:spPr/>
-        <p:txBody>
-          <a:bodyPr>
-            <a:normAutofit lnSpcReduction="10000"/>
-          </a:bodyPr>
-          <a:lstStyle/>
-          <a:p>
-            <a:pPr>
-              <a:lnSpc>
-                <a:spcPct val="150000"/>
-              </a:lnSpc>
-            </a:pPr>
-            <a:r>
-              <a:rPr lang="cs-CZ" dirty="0"/>
-              <a:t>Set </a:t>
-            </a:r>
-            <a:r>
-              <a:rPr lang="cs-CZ" dirty="0" err="1"/>
-              <a:t>of</a:t>
-            </a:r>
-            <a:r>
-              <a:rPr lang="cs-CZ" dirty="0"/>
-              <a:t> </a:t>
-            </a:r>
-            <a:r>
-              <a:rPr lang="cs-CZ" dirty="0" err="1"/>
-              <a:t>algorithms</a:t>
-            </a:r>
-            <a:r>
-              <a:rPr lang="cs-CZ" dirty="0"/>
-              <a:t> - </a:t>
-            </a:r>
-            <a:r>
-              <a:rPr lang="cs-CZ" dirty="0" err="1"/>
-              <a:t>Human</a:t>
-            </a:r>
-            <a:r>
-              <a:rPr lang="cs-CZ" dirty="0"/>
-              <a:t> brain </a:t>
-            </a:r>
-            <a:r>
-              <a:rPr lang="cs-CZ" dirty="0" err="1"/>
-              <a:t>like</a:t>
-            </a:r>
-            <a:endParaRPr lang="cs-CZ" dirty="0"/>
-          </a:p>
-          <a:p>
-            <a:pPr>
-              <a:lnSpc>
-                <a:spcPct val="150000"/>
-              </a:lnSpc>
-            </a:pPr>
-            <a:r>
-              <a:rPr lang="cs-CZ" dirty="0" err="1"/>
-              <a:t>Recognize</a:t>
-            </a:r>
-            <a:r>
-              <a:rPr lang="cs-CZ" dirty="0"/>
-              <a:t> </a:t>
-            </a:r>
-            <a:r>
-              <a:rPr lang="cs-CZ" dirty="0" err="1"/>
-              <a:t>pattern</a:t>
-            </a:r>
-            <a:endParaRPr lang="cs-CZ" dirty="0"/>
-          </a:p>
-          <a:p>
-            <a:pPr>
-              <a:lnSpc>
-                <a:spcPct val="150000"/>
-              </a:lnSpc>
-            </a:pPr>
-            <a:r>
-              <a:rPr lang="cs-CZ" dirty="0" err="1"/>
-              <a:t>Finding</a:t>
-            </a:r>
-            <a:r>
-              <a:rPr lang="cs-CZ" dirty="0"/>
-              <a:t> </a:t>
-            </a:r>
-            <a:r>
-              <a:rPr lang="cs-CZ" dirty="0" err="1"/>
-              <a:t>similarities</a:t>
-            </a:r>
-            <a:endParaRPr lang="cs-CZ" dirty="0"/>
-          </a:p>
-          <a:p>
-            <a:pPr>
-              <a:lnSpc>
-                <a:spcPct val="150000"/>
-              </a:lnSpc>
-            </a:pPr>
-            <a:r>
-              <a:rPr lang="cs-CZ" dirty="0"/>
-              <a:t>Real data (image, </a:t>
-            </a:r>
-            <a:r>
-              <a:rPr lang="cs-CZ" dirty="0" err="1"/>
-              <a:t>sound</a:t>
-            </a:r>
-            <a:r>
-              <a:rPr lang="cs-CZ" dirty="0"/>
-              <a:t>, text …) =&gt; </a:t>
-            </a:r>
-            <a:r>
-              <a:rPr lang="cs-CZ" dirty="0" err="1"/>
-              <a:t>numerical</a:t>
-            </a:r>
-            <a:r>
-              <a:rPr lang="cs-CZ" dirty="0"/>
-              <a:t> </a:t>
-            </a:r>
-            <a:r>
-              <a:rPr lang="cs-CZ" dirty="0" err="1"/>
-              <a:t>representation</a:t>
-            </a:r>
-            <a:endParaRPr lang="cs-CZ" dirty="0"/>
-          </a:p>
-          <a:p>
-            <a:pPr>
-              <a:lnSpc>
-                <a:spcPct val="150000"/>
-              </a:lnSpc>
-            </a:pPr>
-            <a:r>
-              <a:rPr lang="cs-CZ" dirty="0"/>
-              <a:t>Universal </a:t>
-            </a:r>
-            <a:r>
-              <a:rPr lang="cs-CZ" dirty="0" err="1"/>
-              <a:t>Approximator</a:t>
-            </a:r>
-            <a:r>
-              <a:rPr lang="cs-CZ" dirty="0"/>
-              <a:t> – f(</a:t>
-            </a:r>
-            <a:r>
-              <a:rPr lang="cs-CZ" dirty="0" err="1"/>
-              <a:t>x</a:t>
-            </a:r>
-            <a:r>
-              <a:rPr lang="cs-CZ" dirty="0"/>
-              <a:t>) = </a:t>
-            </a:r>
-            <a:r>
-              <a:rPr lang="cs-CZ" dirty="0" err="1"/>
-              <a:t>y</a:t>
-            </a:r>
-            <a:endParaRPr lang="cs-CZ" dirty="0"/>
-          </a:p>
-          <a:p>
-            <a:pPr>
-              <a:lnSpc>
-                <a:spcPct val="150000"/>
-              </a:lnSpc>
-            </a:pPr>
-            <a:r>
-              <a:rPr lang="en" dirty="0"/>
-              <a:t>f(x) = 3x + 12 or f(x) = 9x - 0.1</a:t>
-            </a:r>
-            <a:endParaRPr lang="cs-CZ" dirty="0"/>
-          </a:p>
-          <a:p>
-            <a:endParaRPr lang="cs-CZ" dirty="0"/>
-          </a:p>
-          <a:p>
-            <a:endParaRPr lang="cs-CZ" dirty="0"/>
-          </a:p>
-          <a:p>
-            <a:pPr marL="0" indent="0">
-              <a:buNone/>
-            </a:pPr>
-            <a:endParaRPr lang="cs-CZ" dirty="0"/>
-          </a:p>
-        </p:txBody>
-      </p:sp>
-    </p:spTree>
-    <p:extLst>
-      <p:ext uri="{BB962C8B-B14F-4D97-AF65-F5344CB8AC3E}">
-        <p14:creationId xmlns:p14="http://schemas.microsoft.com/office/powerpoint/2010/main" val="1645345857"/>
-      </p:ext>
-    </p:extLst>
-  </p:cSld>
-  <p:clrMapOvr>
-    <a:masterClrMapping/>
-  </p:clrMapOvr>
-</p:sld>
-</file>
-
 <file path=ppt/slides/slide9.xml><?xml version="1.0" encoding="utf-8"?>
 <p:sld xmlns:a="http://schemas.openxmlformats.org/drawingml/2006/main" xmlns:r="http://schemas.openxmlformats.org/officeDocument/2006/relationships" xmlns:p="http://schemas.openxmlformats.org/presentationml/2006/main">
   <p:cSld>
@@ -9849,7 +10314,7 @@
           <p:cNvPr id="2" name="Title 1">
             <a:extLst>
               <a:ext uri="{FF2B5EF4-FFF2-40B4-BE49-F238E27FC236}">
-                <a16:creationId xmlns:a16="http://schemas.microsoft.com/office/drawing/2014/main" id="{D78F981D-8C26-A64F-A9F4-0FFCAE6AA535}"/>
+                <a16:creationId xmlns:a16="http://schemas.microsoft.com/office/drawing/2014/main" id="{ADD347FF-10DB-494D-BB8C-14E8C19C9CC0}"/>
               </a:ext>
             </a:extLst>
           </p:cNvPr>
@@ -9867,12 +10332,17 @@
           <a:p>
             <a:r>
               <a:rPr lang="cs-CZ" dirty="0" err="1"/>
-              <a:t>Neural</a:t>
+              <a:t>Deep</a:t>
             </a:r>
             <a:r>
               <a:rPr lang="cs-CZ" dirty="0"/>
-              <a:t> Network</a:t>
-            </a:r>
+              <a:t> </a:t>
+            </a:r>
+            <a:r>
+              <a:rPr lang="cs-CZ" dirty="0" err="1"/>
+              <a:t>Learning</a:t>
+            </a:r>
+            <a:endParaRPr lang="cs-CZ" dirty="0"/>
           </a:p>
         </p:txBody>
       </p:sp>
@@ -9881,7 +10351,7 @@
           <p:cNvPr id="3" name="Content Placeholder 2">
             <a:extLst>
               <a:ext uri="{FF2B5EF4-FFF2-40B4-BE49-F238E27FC236}">
-                <a16:creationId xmlns:a16="http://schemas.microsoft.com/office/drawing/2014/main" id="{EF2EB21E-4E41-1549-8DFE-8FD2B45C1CD1}"/>
+                <a16:creationId xmlns:a16="http://schemas.microsoft.com/office/drawing/2014/main" id="{11F0B45D-59BC-5449-84F8-49116E8A2CAA}"/>
               </a:ext>
             </a:extLst>
           </p:cNvPr>
@@ -9894,64 +10364,93 @@
         </p:nvSpPr>
         <p:spPr/>
         <p:txBody>
-          <a:bodyPr/>
+          <a:bodyPr>
+            <a:normAutofit fontScale="92500" lnSpcReduction="20000"/>
+          </a:bodyPr>
           <a:lstStyle/>
           <a:p>
-            <a:endParaRPr lang="cs-CZ"/>
-          </a:p>
-        </p:txBody>
-      </p:sp>
-      <p:pic>
-        <p:nvPicPr>
-          <p:cNvPr id="1026" name="Picture 2" descr="Výsledek obrázku pro neural network">
-            <a:extLst>
-              <a:ext uri="{FF2B5EF4-FFF2-40B4-BE49-F238E27FC236}">
-                <a16:creationId xmlns:a16="http://schemas.microsoft.com/office/drawing/2014/main" id="{D8FCB1BC-4935-B94D-AE0A-A921BBF210BD}"/>
-              </a:ext>
-            </a:extLst>
-          </p:cNvPr>
-          <p:cNvPicPr>
-            <a:picLocks noChangeAspect="1" noChangeArrowheads="1"/>
-          </p:cNvPicPr>
-          <p:nvPr/>
-        </p:nvPicPr>
-        <p:blipFill>
-          <a:blip r:embed="rId2">
-            <a:extLst>
-              <a:ext uri="{28A0092B-C50C-407E-A947-70E740481C1C}">
-                <a14:useLocalDpi xmlns:a14="http://schemas.microsoft.com/office/drawing/2010/main" val="0"/>
-              </a:ext>
-            </a:extLst>
-          </a:blip>
-          <a:srcRect/>
-          <a:stretch>
-            <a:fillRect/>
-          </a:stretch>
-        </p:blipFill>
-        <p:spPr bwMode="auto">
-          <a:xfrm>
-            <a:off x="838200" y="1649691"/>
-            <a:ext cx="10731500" cy="4800600"/>
-          </a:xfrm>
-          <a:prstGeom prst="rect">
-            <a:avLst/>
-          </a:prstGeom>
-          <a:noFill/>
-          <a:extLst>
-            <a:ext uri="{909E8E84-426E-40DD-AFC4-6F175D3DCCD1}">
-              <a14:hiddenFill xmlns:a14="http://schemas.microsoft.com/office/drawing/2010/main">
-                <a:solidFill>
-                  <a:srgbClr val="FFFFFF"/>
-                </a:solidFill>
-              </a14:hiddenFill>
-            </a:ext>
-          </a:extLst>
-        </p:spPr>
-      </p:pic>
+            <a:pPr>
+              <a:lnSpc>
+                <a:spcPct val="150000"/>
+              </a:lnSpc>
+            </a:pPr>
+            <a:r>
+              <a:rPr lang="en-US" dirty="0"/>
+              <a:t>Subset of ML</a:t>
+            </a:r>
+          </a:p>
+          <a:p>
+            <a:pPr>
+              <a:lnSpc>
+                <a:spcPct val="150000"/>
+              </a:lnSpc>
+            </a:pPr>
+            <a:r>
+              <a:rPr lang="en-US" dirty="0"/>
+              <a:t>Inspired by human brain</a:t>
+            </a:r>
+          </a:p>
+          <a:p>
+            <a:pPr>
+              <a:lnSpc>
+                <a:spcPct val="150000"/>
+              </a:lnSpc>
+            </a:pPr>
+            <a:r>
+              <a:rPr lang="en-US" dirty="0"/>
+              <a:t>Data – various categories</a:t>
+            </a:r>
+          </a:p>
+          <a:p>
+            <a:pPr>
+              <a:lnSpc>
+                <a:spcPct val="150000"/>
+              </a:lnSpc>
+            </a:pPr>
+            <a:r>
+              <a:rPr lang="en-US" dirty="0"/>
+              <a:t>Comparing to known items</a:t>
+            </a:r>
+          </a:p>
+          <a:p>
+            <a:pPr>
+              <a:lnSpc>
+                <a:spcPct val="150000"/>
+              </a:lnSpc>
+            </a:pPr>
+            <a:r>
+              <a:rPr lang="en-US" dirty="0"/>
+              <a:t>Neural Networks – brain like decision making</a:t>
+            </a:r>
+          </a:p>
+          <a:p>
+            <a:pPr>
+              <a:lnSpc>
+                <a:spcPct val="150000"/>
+              </a:lnSpc>
+            </a:pPr>
+            <a:r>
+              <a:rPr lang="en-US" dirty="0"/>
+              <a:t>Discovers features</a:t>
+            </a:r>
+          </a:p>
+          <a:p>
+            <a:pPr>
+              <a:lnSpc>
+                <a:spcPct val="150000"/>
+              </a:lnSpc>
+            </a:pPr>
+            <a:r>
+              <a:rPr lang="en-US" dirty="0"/>
+              <a:t>Big amount of training data </a:t>
+            </a:r>
+          </a:p>
+        </p:txBody>
+      </p:sp>
     </p:spTree>
     <p:extLst>
       <p:ext uri="{BB962C8B-B14F-4D97-AF65-F5344CB8AC3E}">
-        <p14:creationId xmlns:p14="http://schemas.microsoft.com/office/powerpoint/2010/main" val="3768205480"/>
+        <p14:creationId xmlns:p14="http://schemas.microsoft.com/office/powerpoint/2010/main" val="2864905902"/>
       </p:ext>
     </p:extLst>
   </p:cSld>
@@ -10753,12 +11252,6 @@
 </file>
 
 <file path=customXml/item1.xml><?xml version="1.0" encoding="utf-8"?>
-<p:properties xmlns:p="http://schemas.microsoft.com/office/2006/metadata/properties" xmlns:xsi="http://www.w3.org/2001/XMLSchema-instance" xmlns:pc="http://schemas.microsoft.com/office/infopath/2007/PartnerControls">
-  <documentManagement/>
-</p:properties>
-</file>
-
-<file path=customXml/item2.xml><?xml version="1.0" encoding="utf-8"?>
 <ct:contentTypeSchema xmlns:ct="http://schemas.microsoft.com/office/2006/metadata/contentType" xmlns:ma="http://schemas.microsoft.com/office/2006/metadata/properties/metaAttributes" ct:_="" ma:_="" ma:contentTypeName="Document" ma:contentTypeID="0x010100E3167789D1389240AD0FE18908C27A7B" ma:contentTypeVersion="8" ma:contentTypeDescription="Create a new document." ma:contentTypeScope="" ma:versionID="53ac4c3e3337004065f46f0987f6a5b2">
   <xsd:schema xmlns:xsd="http://www.w3.org/2001/XMLSchema" xmlns:xs="http://www.w3.org/2001/XMLSchema" xmlns:p="http://schemas.microsoft.com/office/2006/metadata/properties" xmlns:ns2="0cfd5889-7daf-4154-9e8b-c0abca84f0a6" xmlns:ns3="59edcec1-9856-43f4-8dbb-53890193e89f" targetNamespace="http://schemas.microsoft.com/office/2006/metadata/properties" ma:root="true" ma:fieldsID="6efe4f6bf9058adb7833f28b7d29763a" ns2:_="" ns3:_="">
     <xsd:import namespace="0cfd5889-7daf-4154-9e8b-c0abca84f0a6"/>
@@ -10949,6 +11442,12 @@
 </ct:contentTypeSchema>
 </file>
 
+<file path=customXml/item2.xml><?xml version="1.0" encoding="utf-8"?>
+<p:properties xmlns:p="http://schemas.microsoft.com/office/2006/metadata/properties" xmlns:xsi="http://www.w3.org/2001/XMLSchema-instance" xmlns:pc="http://schemas.microsoft.com/office/infopath/2007/PartnerControls">
+  <documentManagement/>
+</p:properties>
+</file>
+
 <file path=customXml/item3.xml><?xml version="1.0" encoding="utf-8"?>
 <?mso-contentType ?>
 <FormTemplates xmlns="http://schemas.microsoft.com/sharepoint/v3/contenttype/forms">
@@ -10959,23 +11458,6 @@
 </file>
 
 <file path=customXml/itemProps1.xml><?xml version="1.0" encoding="utf-8"?>
-<ds:datastoreItem xmlns:ds="http://schemas.openxmlformats.org/officeDocument/2006/customXml" ds:itemID="{0B1A5D1D-0F55-42C7-82C6-AB9D4E2570E7}">
-  <ds:schemaRefs>
-    <ds:schemaRef ds:uri="http://purl.org/dc/elements/1.1/"/>
-    <ds:schemaRef ds:uri="0cfd5889-7daf-4154-9e8b-c0abca84f0a6"/>
-    <ds:schemaRef ds:uri="http://schemas.microsoft.com/office/2006/metadata/properties"/>
-    <ds:schemaRef ds:uri="http://schemas.microsoft.com/office/infopath/2007/PartnerControls"/>
-    <ds:schemaRef ds:uri="http://www.w3.org/XML/1998/namespace"/>
-    <ds:schemaRef ds:uri="http://schemas.microsoft.com/office/2006/documentManagement/types"/>
-    <ds:schemaRef ds:uri="http://purl.org/dc/terms/"/>
-    <ds:schemaRef ds:uri="http://purl.org/dc/dcmitype/"/>
-    <ds:schemaRef ds:uri="http://schemas.openxmlformats.org/package/2006/metadata/core-properties"/>
-    <ds:schemaRef ds:uri="59edcec1-9856-43f4-8dbb-53890193e89f"/>
-  </ds:schemaRefs>
-</ds:datastoreItem>
-</file>
-
-<file path=customXml/itemProps2.xml><?xml version="1.0" encoding="utf-8"?>
 <ds:datastoreItem xmlns:ds="http://schemas.openxmlformats.org/officeDocument/2006/customXml" ds:itemID="{07C2F047-437D-4C04-8CB8-276653C0330B}">
   <ds:schemaRefs>
     <ds:schemaRef ds:uri="http://schemas.microsoft.com/office/2006/metadata/contentType"/>
@@ -10994,6 +11476,23 @@
 </ds:datastoreItem>
 </file>
 
+<file path=customXml/itemProps2.xml><?xml version="1.0" encoding="utf-8"?>
+<ds:datastoreItem xmlns:ds="http://schemas.openxmlformats.org/officeDocument/2006/customXml" ds:itemID="{0B1A5D1D-0F55-42C7-82C6-AB9D4E2570E7}">
+  <ds:schemaRefs>
+    <ds:schemaRef ds:uri="http://purl.org/dc/elements/1.1/"/>
+    <ds:schemaRef ds:uri="0cfd5889-7daf-4154-9e8b-c0abca84f0a6"/>
+    <ds:schemaRef ds:uri="http://schemas.microsoft.com/office/2006/metadata/properties"/>
+    <ds:schemaRef ds:uri="http://schemas.microsoft.com/office/infopath/2007/PartnerControls"/>
+    <ds:schemaRef ds:uri="http://www.w3.org/XML/1998/namespace"/>
+    <ds:schemaRef ds:uri="http://schemas.microsoft.com/office/2006/documentManagement/types"/>
+    <ds:schemaRef ds:uri="http://purl.org/dc/terms/"/>
+    <ds:schemaRef ds:uri="http://purl.org/dc/dcmitype/"/>
+    <ds:schemaRef ds:uri="http://schemas.openxmlformats.org/package/2006/metadata/core-properties"/>
+    <ds:schemaRef ds:uri="59edcec1-9856-43f4-8dbb-53890193e89f"/>
+  </ds:schemaRefs>
+</ds:datastoreItem>
+</file>
+
 <file path=customXml/itemProps3.xml><?xml version="1.0" encoding="utf-8"?>
 <ds:datastoreItem xmlns:ds="http://schemas.openxmlformats.org/officeDocument/2006/customXml" ds:itemID="{1B83C24D-7F0D-4357-BE2D-951382ACA9FB}">
   <ds:schemaRefs>

</xml_diff>